<commit_message>
Lecture 18 and 19 Commit
</commit_message>
<xml_diff>
--- a/Lecture/Lecture 18/Lecture 18.pptx
+++ b/Lecture/Lecture 18/Lecture 18.pptx
@@ -6,10 +6,10 @@
     <p:sldMasterId id="2147483676" r:id="rId2"/>
   </p:sldMasterIdLst>
   <p:notesMasterIdLst>
-    <p:notesMasterId r:id="rId20"/>
+    <p:notesMasterId r:id="rId14"/>
   </p:notesMasterIdLst>
   <p:handoutMasterIdLst>
-    <p:handoutMasterId r:id="rId21"/>
+    <p:handoutMasterId r:id="rId15"/>
   </p:handoutMasterIdLst>
   <p:sldIdLst>
     <p:sldId id="320" r:id="rId3"/>
@@ -22,18 +22,12 @@
     <p:sldId id="403" r:id="rId10"/>
     <p:sldId id="402" r:id="rId11"/>
     <p:sldId id="405" r:id="rId12"/>
-    <p:sldId id="406" r:id="rId13"/>
-    <p:sldId id="407" r:id="rId14"/>
-    <p:sldId id="408" r:id="rId15"/>
-    <p:sldId id="404" r:id="rId16"/>
-    <p:sldId id="409" r:id="rId17"/>
-    <p:sldId id="411" r:id="rId18"/>
-    <p:sldId id="329" r:id="rId19"/>
+    <p:sldId id="329" r:id="rId13"/>
   </p:sldIdLst>
   <p:sldSz cx="9144000" cy="6858000" type="screen4x3"/>
   <p:notesSz cx="6858000" cy="9144000"/>
   <p:custDataLst>
-    <p:tags r:id="rId22"/>
+    <p:tags r:id="rId16"/>
   </p:custDataLst>
   <p:defaultTextStyle>
     <a:defPPr>
@@ -304,7 +298,7 @@
               <a:pPr>
                 <a:defRPr/>
               </a:pPr>
-              <a:t>10/9/2018</a:t>
+              <a:t>10/10/2018</a:t>
             </a:fld>
             <a:endParaRPr lang="en-US" dirty="0"/>
           </a:p>
@@ -516,7 +510,7 @@
               <a:pPr>
                 <a:defRPr/>
               </a:pPr>
-              <a:t>10/9/2018</a:t>
+              <a:t>10/10/2018</a:t>
             </a:fld>
             <a:endParaRPr lang="en-US" dirty="0"/>
           </a:p>
@@ -1035,7 +1029,7 @@
               <a:pPr>
                 <a:defRPr/>
               </a:pPr>
-              <a:t>10/9/2018</a:t>
+              <a:t>10/10/2018</a:t>
             </a:fld>
             <a:endParaRPr lang="en-US" dirty="0"/>
           </a:p>
@@ -1225,7 +1219,7 @@
               <a:pPr>
                 <a:defRPr/>
               </a:pPr>
-              <a:t>10/9/2018</a:t>
+              <a:t>10/10/2018</a:t>
             </a:fld>
             <a:endParaRPr lang="en-US" dirty="0"/>
           </a:p>
@@ -1425,7 +1419,7 @@
               <a:pPr>
                 <a:defRPr/>
               </a:pPr>
-              <a:t>10/9/2018</a:t>
+              <a:t>10/10/2018</a:t>
             </a:fld>
             <a:endParaRPr lang="en-US" dirty="0"/>
           </a:p>
@@ -1693,7 +1687,7 @@
               <a:pPr>
                 <a:defRPr/>
               </a:pPr>
-              <a:t>10/9/2018</a:t>
+              <a:t>10/10/2018</a:t>
             </a:fld>
             <a:endParaRPr lang="en-US" dirty="0">
               <a:solidFill>
@@ -1907,7 +1901,7 @@
               <a:pPr>
                 <a:defRPr/>
               </a:pPr>
-              <a:t>10/9/2018</a:t>
+              <a:t>10/10/2018</a:t>
             </a:fld>
             <a:endParaRPr lang="en-US" dirty="0">
               <a:solidFill>
@@ -2198,7 +2192,7 @@
               <a:pPr>
                 <a:defRPr/>
               </a:pPr>
-              <a:t>10/9/2018</a:t>
+              <a:t>10/10/2018</a:t>
             </a:fld>
             <a:endParaRPr lang="en-US" dirty="0">
               <a:solidFill>
@@ -2529,7 +2523,7 @@
               <a:pPr>
                 <a:defRPr/>
               </a:pPr>
-              <a:t>10/9/2018</a:t>
+              <a:t>10/10/2018</a:t>
             </a:fld>
             <a:endParaRPr lang="en-US" dirty="0">
               <a:solidFill>
@@ -2994,7 +2988,7 @@
               <a:pPr>
                 <a:defRPr/>
               </a:pPr>
-              <a:t>10/9/2018</a:t>
+              <a:t>10/10/2018</a:t>
             </a:fld>
             <a:endParaRPr lang="en-US" dirty="0">
               <a:solidFill>
@@ -3157,7 +3151,7 @@
               <a:pPr>
                 <a:defRPr/>
               </a:pPr>
-              <a:t>10/9/2018</a:t>
+              <a:t>10/10/2018</a:t>
             </a:fld>
             <a:endParaRPr lang="en-US" dirty="0">
               <a:solidFill>
@@ -3298,7 +3292,7 @@
               <a:pPr>
                 <a:defRPr/>
               </a:pPr>
-              <a:t>10/9/2018</a:t>
+              <a:t>10/10/2018</a:t>
             </a:fld>
             <a:endParaRPr lang="en-US" dirty="0">
               <a:solidFill>
@@ -3619,7 +3613,7 @@
               <a:pPr>
                 <a:defRPr/>
               </a:pPr>
-              <a:t>10/9/2018</a:t>
+              <a:t>10/10/2018</a:t>
             </a:fld>
             <a:endParaRPr lang="en-US" dirty="0">
               <a:solidFill>
@@ -3827,7 +3821,7 @@
               <a:pPr>
                 <a:defRPr/>
               </a:pPr>
-              <a:t>10/9/2018</a:t>
+              <a:t>10/10/2018</a:t>
             </a:fld>
             <a:endParaRPr lang="en-US" dirty="0"/>
           </a:p>
@@ -4110,7 +4104,7 @@
               <a:pPr>
                 <a:defRPr/>
               </a:pPr>
-              <a:t>10/9/2018</a:t>
+              <a:t>10/10/2018</a:t>
             </a:fld>
             <a:endParaRPr lang="en-US" dirty="0">
               <a:solidFill>
@@ -4324,7 +4318,7 @@
               <a:pPr>
                 <a:defRPr/>
               </a:pPr>
-              <a:t>10/9/2018</a:t>
+              <a:t>10/10/2018</a:t>
             </a:fld>
             <a:endParaRPr lang="en-US" dirty="0">
               <a:solidFill>
@@ -4548,7 +4542,7 @@
               <a:pPr>
                 <a:defRPr/>
               </a:pPr>
-              <a:t>10/9/2018</a:t>
+              <a:t>10/10/2018</a:t>
             </a:fld>
             <a:endParaRPr lang="en-US" dirty="0">
               <a:solidFill>
@@ -4758,7 +4752,7 @@
               <a:pPr>
                 <a:defRPr/>
               </a:pPr>
-              <a:t>10/9/2018</a:t>
+              <a:t>10/10/2018</a:t>
             </a:fld>
             <a:endParaRPr lang="en-US" dirty="0">
               <a:solidFill>
@@ -5035,7 +5029,7 @@
               <a:pPr>
                 <a:defRPr/>
               </a:pPr>
-              <a:t>10/9/2018</a:t>
+              <a:t>10/10/2018</a:t>
             </a:fld>
             <a:endParaRPr lang="en-US" dirty="0"/>
           </a:p>
@@ -5342,7 +5336,7 @@
               <a:pPr>
                 <a:defRPr/>
               </a:pPr>
-              <a:t>10/9/2018</a:t>
+              <a:t>10/10/2018</a:t>
             </a:fld>
             <a:endParaRPr lang="en-US" dirty="0"/>
           </a:p>
@@ -5783,7 +5777,7 @@
               <a:pPr>
                 <a:defRPr/>
               </a:pPr>
-              <a:t>10/9/2018</a:t>
+              <a:t>10/10/2018</a:t>
             </a:fld>
             <a:endParaRPr lang="en-US" dirty="0"/>
           </a:p>
@@ -5922,7 +5916,7 @@
               <a:pPr>
                 <a:defRPr/>
               </a:pPr>
-              <a:t>10/9/2018</a:t>
+              <a:t>10/10/2018</a:t>
             </a:fld>
             <a:endParaRPr lang="en-US" dirty="0"/>
           </a:p>
@@ -6039,7 +6033,7 @@
               <a:pPr>
                 <a:defRPr/>
               </a:pPr>
-              <a:t>10/9/2018</a:t>
+              <a:t>10/10/2018</a:t>
             </a:fld>
             <a:endParaRPr lang="en-US" dirty="0"/>
           </a:p>
@@ -6336,7 +6330,7 @@
               <a:pPr>
                 <a:defRPr/>
               </a:pPr>
-              <a:t>10/9/2018</a:t>
+              <a:t>10/10/2018</a:t>
             </a:fld>
             <a:endParaRPr lang="en-US" dirty="0"/>
           </a:p>
@@ -6613,7 +6607,7 @@
               <a:pPr>
                 <a:defRPr/>
               </a:pPr>
-              <a:t>10/9/2018</a:t>
+              <a:t>10/10/2018</a:t>
             </a:fld>
             <a:endParaRPr lang="en-US" dirty="0"/>
           </a:p>
@@ -6870,7 +6864,7 @@
               <a:pPr>
                 <a:defRPr/>
               </a:pPr>
-              <a:t>10/9/2018</a:t>
+              <a:t>10/10/2018</a:t>
             </a:fld>
             <a:endParaRPr lang="en-US" dirty="0"/>
           </a:p>
@@ -7580,7 +7574,7 @@
               <a:pPr>
                 <a:defRPr/>
               </a:pPr>
-              <a:t>10/9/2018</a:t>
+              <a:t>10/10/2018</a:t>
             </a:fld>
             <a:endParaRPr lang="en-US" dirty="0">
               <a:solidFill>
@@ -9030,2326 +9024,6 @@
           <a:bodyPr rtlCol="0" anchor="ctr"/>
           <a:lstStyle/>
           <a:p>
-            <a:pPr marL="0" marR="0" lvl="0" indent="0" algn="ctr" defTabSz="457200" rtl="0" eaLnBrk="1" fontAlgn="base" latinLnBrk="0" hangingPunct="1">
-              <a:lnSpc>
-                <a:spcPct val="100000"/>
-              </a:lnSpc>
-              <a:spcBef>
-                <a:spcPct val="0"/>
-              </a:spcBef>
-              <a:spcAft>
-                <a:spcPct val="0"/>
-              </a:spcAft>
-              <a:buClrTx/>
-              <a:buSzTx/>
-              <a:buFontTx/>
-              <a:buNone/>
-              <a:tabLst/>
-              <a:defRPr/>
-            </a:pPr>
-            <a:endParaRPr kumimoji="0" lang="en-US" sz="2400" b="0" i="0" u="none" strike="noStrike" kern="1200" cap="none" spc="0" normalizeH="0" baseline="0" noProof="0">
-              <a:ln>
-                <a:noFill/>
-              </a:ln>
-              <a:solidFill>
-                <a:prstClr val="white"/>
-              </a:solidFill>
-              <a:effectLst/>
-              <a:uLnTx/>
-              <a:uFillTx/>
-              <a:latin typeface="Calibri"/>
-              <a:ea typeface="+mn-ea"/>
-              <a:cs typeface="+mn-cs"/>
-            </a:endParaRPr>
-          </a:p>
-        </p:txBody>
-      </p:sp>
-      <p:sp>
-        <p:nvSpPr>
-          <p:cNvPr id="2" name="Title 1"/>
-          <p:cNvSpPr>
-            <a:spLocks noGrp="1"/>
-          </p:cNvSpPr>
-          <p:nvPr>
-            <p:ph type="title"/>
-          </p:nvPr>
-        </p:nvSpPr>
-        <p:spPr>
-          <a:xfrm>
-            <a:off x="482600" y="643467"/>
-            <a:ext cx="2522980" cy="1597315"/>
-          </a:xfrm>
-          <a:noFill/>
-          <a:ln w="19050">
-            <a:solidFill>
-              <a:schemeClr val="bg1"/>
-            </a:solidFill>
-          </a:ln>
-        </p:spPr>
-        <p:txBody>
-          <a:bodyPr vert="horz" wrap="square" lIns="91440" tIns="45720" rIns="91440" bIns="45720" rtlCol="0" anchor="ctr">
-            <a:normAutofit/>
-          </a:bodyPr>
-          <a:lstStyle/>
-          <a:p>
-            <a:pPr defTabSz="914400" eaLnBrk="1" hangingPunct="1">
-              <a:lnSpc>
-                <a:spcPct val="90000"/>
-              </a:lnSpc>
-            </a:pPr>
-            <a:r>
-              <a:rPr lang="en-US" sz="2400" dirty="0">
-                <a:solidFill>
-                  <a:schemeClr val="bg1"/>
-                </a:solidFill>
-              </a:rPr>
-              <a:t>Part 2: Loops</a:t>
-            </a:r>
-            <a:endParaRPr lang="en-US" sz="2400" kern="1200" dirty="0">
-              <a:solidFill>
-                <a:schemeClr val="bg1"/>
-              </a:solidFill>
-              <a:latin typeface="+mj-lt"/>
-              <a:ea typeface="+mj-ea"/>
-              <a:cs typeface="+mj-cs"/>
-            </a:endParaRPr>
-          </a:p>
-        </p:txBody>
-      </p:sp>
-      <p:pic>
-        <p:nvPicPr>
-          <p:cNvPr id="8" name="Picture 7">
-            <a:extLst>
-              <a:ext uri="{FF2B5EF4-FFF2-40B4-BE49-F238E27FC236}">
-                <a16:creationId xmlns:a16="http://schemas.microsoft.com/office/drawing/2014/main" id="{521D4292-9ECC-4DA5-8CC0-C561A0DA118E}"/>
-              </a:ext>
-            </a:extLst>
-          </p:cNvPr>
-          <p:cNvPicPr>
-            <a:picLocks noChangeAspect="1"/>
-          </p:cNvPicPr>
-          <p:nvPr/>
-        </p:nvPicPr>
-        <p:blipFill rotWithShape="1">
-          <a:blip r:embed="rId3"/>
-          <a:srcRect l="8000" r="9400"/>
-          <a:stretch/>
-        </p:blipFill>
-        <p:spPr>
-          <a:xfrm>
-            <a:off x="660103" y="3048000"/>
-            <a:ext cx="2167974" cy="2624666"/>
-          </a:xfrm>
-          <a:prstGeom prst="rect">
-            <a:avLst/>
-          </a:prstGeom>
-          <a:noFill/>
-        </p:spPr>
-      </p:pic>
-      <p:sp>
-        <p:nvSpPr>
-          <p:cNvPr id="6" name="TextBox 5">
-            <a:extLst>
-              <a:ext uri="{FF2B5EF4-FFF2-40B4-BE49-F238E27FC236}">
-                <a16:creationId xmlns:a16="http://schemas.microsoft.com/office/drawing/2014/main" id="{E58EF064-51FF-48A9-8810-E84BE6F6F09D}"/>
-              </a:ext>
-            </a:extLst>
-          </p:cNvPr>
-          <p:cNvSpPr txBox="1"/>
-          <p:nvPr/>
-        </p:nvSpPr>
-        <p:spPr>
-          <a:xfrm>
-            <a:off x="3810000" y="643972"/>
-            <a:ext cx="5410200" cy="6370975"/>
-          </a:xfrm>
-          <a:prstGeom prst="rect">
-            <a:avLst/>
-          </a:prstGeom>
-          <a:noFill/>
-        </p:spPr>
-        <p:txBody>
-          <a:bodyPr wrap="square" rtlCol="0">
-            <a:spAutoFit/>
-          </a:bodyPr>
-          <a:lstStyle/>
-          <a:p>
-            <a:pPr marL="342900" indent="-342900">
-              <a:buFont typeface="Arial" panose="020B0604020202020204" pitchFamily="34" charset="0"/>
-              <a:buChar char="•"/>
-              <a:defRPr/>
-            </a:pPr>
-            <a:r>
-              <a:rPr lang="en-US" dirty="0">
-                <a:solidFill>
-                  <a:srgbClr val="404040"/>
-                </a:solidFill>
-              </a:rPr>
-              <a:t>Correlation Matrix </a:t>
-            </a:r>
-          </a:p>
-          <a:p>
-            <a:pPr marL="800100" lvl="1" indent="-342900">
-              <a:buFont typeface="Arial" panose="020B0604020202020204" pitchFamily="34" charset="0"/>
-              <a:buChar char="•"/>
-              <a:defRPr/>
-            </a:pPr>
-            <a:r>
-              <a:rPr lang="en-US" dirty="0">
-                <a:solidFill>
-                  <a:srgbClr val="404040"/>
-                </a:solidFill>
-              </a:rPr>
-              <a:t>Definition: Matrix Which Shows the Correlation Between Every Pair of Numeric Variables</a:t>
-            </a:r>
-          </a:p>
-          <a:p>
-            <a:pPr marL="800100" lvl="1" indent="-342900">
-              <a:buFont typeface="Arial" panose="020B0604020202020204" pitchFamily="34" charset="0"/>
-              <a:buChar char="•"/>
-              <a:defRPr/>
-            </a:pPr>
-            <a:r>
-              <a:rPr lang="en-US" dirty="0">
-                <a:solidFill>
-                  <a:srgbClr val="404040"/>
-                </a:solidFill>
-              </a:rPr>
-              <a:t>Used to Understand Strength of Linear Relationships Between Numeric Variables</a:t>
-            </a:r>
-          </a:p>
-          <a:p>
-            <a:pPr marL="800100" lvl="1" indent="-342900">
-              <a:buFont typeface="Arial" panose="020B0604020202020204" pitchFamily="34" charset="0"/>
-              <a:buChar char="•"/>
-              <a:defRPr/>
-            </a:pPr>
-            <a:r>
-              <a:rPr lang="en-US" dirty="0">
-                <a:solidFill>
-                  <a:srgbClr val="404040"/>
-                </a:solidFill>
-              </a:rPr>
-              <a:t>Helpful in Measuring Collinearity</a:t>
-            </a:r>
-          </a:p>
-          <a:p>
-            <a:pPr marL="342900" indent="-342900">
-              <a:buFont typeface="Arial" panose="020B0604020202020204" pitchFamily="34" charset="0"/>
-              <a:buChar char="•"/>
-              <a:defRPr/>
-            </a:pPr>
-            <a:endParaRPr lang="en-US" dirty="0">
-              <a:solidFill>
-                <a:srgbClr val="404040"/>
-              </a:solidFill>
-            </a:endParaRPr>
-          </a:p>
-          <a:p>
-            <a:pPr marL="342900" indent="-342900">
-              <a:buFont typeface="Arial" panose="020B0604020202020204" pitchFamily="34" charset="0"/>
-              <a:buChar char="•"/>
-              <a:defRPr/>
-            </a:pPr>
-            <a:r>
-              <a:rPr lang="en-US" dirty="0">
-                <a:solidFill>
-                  <a:srgbClr val="404040"/>
-                </a:solidFill>
-              </a:rPr>
-              <a:t>Run Chunk 4</a:t>
-            </a:r>
-          </a:p>
-          <a:p>
-            <a:pPr marL="800100" lvl="1" indent="-342900">
-              <a:buFont typeface="Arial" panose="020B0604020202020204" pitchFamily="34" charset="0"/>
-              <a:buChar char="•"/>
-              <a:defRPr/>
-            </a:pPr>
-            <a:r>
-              <a:rPr lang="en-US" dirty="0">
-                <a:solidFill>
-                  <a:srgbClr val="404040"/>
-                </a:solidFill>
-              </a:rPr>
-              <a:t>Inspect the Variables in Cigar</a:t>
-            </a:r>
-          </a:p>
-          <a:p>
-            <a:pPr marL="800100" lvl="1" indent="-342900">
-              <a:buFont typeface="Arial" panose="020B0604020202020204" pitchFamily="34" charset="0"/>
-              <a:buChar char="•"/>
-              <a:defRPr/>
-            </a:pPr>
-            <a:r>
-              <a:rPr lang="en-US" dirty="0">
-                <a:solidFill>
-                  <a:srgbClr val="404040"/>
-                </a:solidFill>
-              </a:rPr>
-              <a:t>Inspect the Correlation Matrix</a:t>
-            </a:r>
-          </a:p>
-          <a:p>
-            <a:pPr marL="800100" lvl="1" indent="-342900">
-              <a:buFont typeface="Arial" panose="020B0604020202020204" pitchFamily="34" charset="0"/>
-              <a:buChar char="•"/>
-              <a:defRPr/>
-            </a:pPr>
-            <a:r>
-              <a:rPr lang="en-US" dirty="0">
-                <a:solidFill>
-                  <a:srgbClr val="404040"/>
-                </a:solidFill>
-              </a:rPr>
-              <a:t>Which Variable(s) is Inappropriate for a Correlation Analysis? Why?</a:t>
-            </a:r>
-          </a:p>
-          <a:p>
-            <a:pPr marL="800100" lvl="1" indent="-342900">
-              <a:buFont typeface="Arial" panose="020B0604020202020204" pitchFamily="34" charset="0"/>
-              <a:buChar char="•"/>
-              <a:defRPr/>
-            </a:pPr>
-            <a:endParaRPr lang="en-US" dirty="0">
-              <a:solidFill>
-                <a:srgbClr val="404040"/>
-              </a:solidFill>
-            </a:endParaRPr>
-          </a:p>
-          <a:p>
-            <a:pPr>
-              <a:defRPr/>
-            </a:pPr>
-            <a:endParaRPr lang="en-US" dirty="0">
-              <a:solidFill>
-                <a:srgbClr val="404040"/>
-              </a:solidFill>
-            </a:endParaRPr>
-          </a:p>
-        </p:txBody>
-      </p:sp>
-    </p:spTree>
-    <p:custDataLst>
-      <p:tags r:id="rId1"/>
-    </p:custDataLst>
-    <p:extLst>
-      <p:ext uri="{BB962C8B-B14F-4D97-AF65-F5344CB8AC3E}">
-        <p14:creationId xmlns:p14="http://schemas.microsoft.com/office/powerpoint/2010/main" val="2699554766"/>
-      </p:ext>
-    </p:extLst>
-  </p:cSld>
-  <p:clrMapOvr>
-    <a:masterClrMapping/>
-  </p:clrMapOvr>
-</p:sld>
-</file>
-
-<file path=ppt/slides/slide12.xml><?xml version="1.0" encoding="utf-8"?>
-<p:sld xmlns:a="http://schemas.openxmlformats.org/drawingml/2006/main" xmlns:r="http://schemas.openxmlformats.org/officeDocument/2006/relationships" xmlns:p="http://schemas.openxmlformats.org/presentationml/2006/main">
-  <p:cSld>
-    <p:bg>
-      <p:bgPr>
-        <a:solidFill>
-          <a:schemeClr val="bg1">
-            <a:lumMod val="85000"/>
-          </a:schemeClr>
-        </a:solidFill>
-        <a:effectLst/>
-      </p:bgPr>
-    </p:bg>
-    <p:spTree>
-      <p:nvGrpSpPr>
-        <p:cNvPr id="1" name=""/>
-        <p:cNvGrpSpPr/>
-        <p:nvPr/>
-      </p:nvGrpSpPr>
-      <p:grpSpPr>
-        <a:xfrm>
-          <a:off x="0" y="0"/>
-          <a:ext cx="0" cy="0"/>
-          <a:chOff x="0" y="0"/>
-          <a:chExt cx="0" cy="0"/>
-        </a:xfrm>
-      </p:grpSpPr>
-      <p:sp>
-        <p:nvSpPr>
-          <p:cNvPr id="15" name="Rectangle 12">
-            <a:extLst>
-              <a:ext uri="{FF2B5EF4-FFF2-40B4-BE49-F238E27FC236}">
-                <a16:creationId xmlns:a16="http://schemas.microsoft.com/office/drawing/2014/main" id="{867D4867-5BA7-4462-B2F6-A23F4A622AA7}"/>
-              </a:ext>
-              <a:ext uri="{C183D7F6-B498-43B3-948B-1728B52AA6E4}">
-                <adec:decorative xmlns:adec="http://schemas.microsoft.com/office/drawing/2017/decorative" val="1"/>
-              </a:ext>
-            </a:extLst>
-          </p:cNvPr>
-          <p:cNvSpPr>
-            <a:spLocks noGrp="1" noRot="1" noChangeAspect="1" noMove="1" noResize="1" noEditPoints="1" noAdjustHandles="1" noChangeArrowheads="1" noChangeShapeType="1" noTextEdit="1"/>
-          </p:cNvSpPr>
-          <p:nvPr>
-            <p:extLst>
-              <p:ext uri="{386F3935-93C4-4BCD-93E2-E3B085C9AB24}">
-                <p16:designElem xmlns:p16="http://schemas.microsoft.com/office/powerpoint/2015/main" val="1"/>
-              </p:ext>
-            </p:extLst>
-          </p:nvPr>
-        </p:nvSpPr>
-        <p:spPr>
-          <a:xfrm>
-            <a:off x="0" y="0"/>
-            <a:ext cx="3490722" cy="6858000"/>
-          </a:xfrm>
-          <a:prstGeom prst="rect">
-            <a:avLst/>
-          </a:prstGeom>
-          <a:solidFill>
-            <a:schemeClr val="tx1">
-              <a:lumMod val="75000"/>
-              <a:lumOff val="25000"/>
-            </a:schemeClr>
-          </a:solidFill>
-          <a:ln>
-            <a:noFill/>
-          </a:ln>
-        </p:spPr>
-        <p:style>
-          <a:lnRef idx="0">
-            <a:scrgbClr r="0" g="0" b="0"/>
-          </a:lnRef>
-          <a:fillRef idx="0">
-            <a:scrgbClr r="0" g="0" b="0"/>
-          </a:fillRef>
-          <a:effectRef idx="0">
-            <a:scrgbClr r="0" g="0" b="0"/>
-          </a:effectRef>
-          <a:fontRef idx="minor">
-            <a:schemeClr val="lt1"/>
-          </a:fontRef>
-        </p:style>
-        <p:txBody>
-          <a:bodyPr rtlCol="0" anchor="ctr"/>
-          <a:lstStyle/>
-          <a:p>
-            <a:pPr marL="0" marR="0" lvl="0" indent="0" algn="ctr" defTabSz="457200" rtl="0" eaLnBrk="1" fontAlgn="base" latinLnBrk="0" hangingPunct="1">
-              <a:lnSpc>
-                <a:spcPct val="100000"/>
-              </a:lnSpc>
-              <a:spcBef>
-                <a:spcPct val="0"/>
-              </a:spcBef>
-              <a:spcAft>
-                <a:spcPct val="0"/>
-              </a:spcAft>
-              <a:buClrTx/>
-              <a:buSzTx/>
-              <a:buFontTx/>
-              <a:buNone/>
-              <a:tabLst/>
-              <a:defRPr/>
-            </a:pPr>
-            <a:endParaRPr kumimoji="0" lang="en-US" sz="2400" b="0" i="0" u="none" strike="noStrike" kern="1200" cap="none" spc="0" normalizeH="0" baseline="0" noProof="0">
-              <a:ln>
-                <a:noFill/>
-              </a:ln>
-              <a:solidFill>
-                <a:prstClr val="white"/>
-              </a:solidFill>
-              <a:effectLst/>
-              <a:uLnTx/>
-              <a:uFillTx/>
-              <a:latin typeface="Calibri"/>
-              <a:ea typeface="+mn-ea"/>
-              <a:cs typeface="+mn-cs"/>
-            </a:endParaRPr>
-          </a:p>
-        </p:txBody>
-      </p:sp>
-      <p:sp>
-        <p:nvSpPr>
-          <p:cNvPr id="2" name="Title 1"/>
-          <p:cNvSpPr>
-            <a:spLocks noGrp="1"/>
-          </p:cNvSpPr>
-          <p:nvPr>
-            <p:ph type="title"/>
-          </p:nvPr>
-        </p:nvSpPr>
-        <p:spPr>
-          <a:xfrm>
-            <a:off x="482600" y="643467"/>
-            <a:ext cx="2522980" cy="1597315"/>
-          </a:xfrm>
-          <a:noFill/>
-          <a:ln w="19050">
-            <a:solidFill>
-              <a:schemeClr val="bg1"/>
-            </a:solidFill>
-          </a:ln>
-        </p:spPr>
-        <p:txBody>
-          <a:bodyPr vert="horz" wrap="square" lIns="91440" tIns="45720" rIns="91440" bIns="45720" rtlCol="0" anchor="ctr">
-            <a:normAutofit/>
-          </a:bodyPr>
-          <a:lstStyle/>
-          <a:p>
-            <a:pPr defTabSz="914400" eaLnBrk="1" hangingPunct="1">
-              <a:lnSpc>
-                <a:spcPct val="90000"/>
-              </a:lnSpc>
-            </a:pPr>
-            <a:r>
-              <a:rPr lang="en-US" sz="2400" dirty="0">
-                <a:solidFill>
-                  <a:schemeClr val="bg1"/>
-                </a:solidFill>
-              </a:rPr>
-              <a:t>Part 2: Loops</a:t>
-            </a:r>
-            <a:endParaRPr lang="en-US" sz="2400" kern="1200" dirty="0">
-              <a:solidFill>
-                <a:schemeClr val="bg1"/>
-              </a:solidFill>
-              <a:latin typeface="+mj-lt"/>
-              <a:ea typeface="+mj-ea"/>
-              <a:cs typeface="+mj-cs"/>
-            </a:endParaRPr>
-          </a:p>
-        </p:txBody>
-      </p:sp>
-      <p:pic>
-        <p:nvPicPr>
-          <p:cNvPr id="8" name="Picture 7">
-            <a:extLst>
-              <a:ext uri="{FF2B5EF4-FFF2-40B4-BE49-F238E27FC236}">
-                <a16:creationId xmlns:a16="http://schemas.microsoft.com/office/drawing/2014/main" id="{521D4292-9ECC-4DA5-8CC0-C561A0DA118E}"/>
-              </a:ext>
-            </a:extLst>
-          </p:cNvPr>
-          <p:cNvPicPr>
-            <a:picLocks noChangeAspect="1"/>
-          </p:cNvPicPr>
-          <p:nvPr/>
-        </p:nvPicPr>
-        <p:blipFill rotWithShape="1">
-          <a:blip r:embed="rId3"/>
-          <a:srcRect l="8000" r="9400"/>
-          <a:stretch/>
-        </p:blipFill>
-        <p:spPr>
-          <a:xfrm>
-            <a:off x="660103" y="3048000"/>
-            <a:ext cx="2167974" cy="2624666"/>
-          </a:xfrm>
-          <a:prstGeom prst="rect">
-            <a:avLst/>
-          </a:prstGeom>
-          <a:noFill/>
-        </p:spPr>
-      </p:pic>
-      <p:sp>
-        <p:nvSpPr>
-          <p:cNvPr id="6" name="TextBox 5">
-            <a:extLst>
-              <a:ext uri="{FF2B5EF4-FFF2-40B4-BE49-F238E27FC236}">
-                <a16:creationId xmlns:a16="http://schemas.microsoft.com/office/drawing/2014/main" id="{E58EF064-51FF-48A9-8810-E84BE6F6F09D}"/>
-              </a:ext>
-            </a:extLst>
-          </p:cNvPr>
-          <p:cNvSpPr txBox="1"/>
-          <p:nvPr/>
-        </p:nvSpPr>
-        <p:spPr>
-          <a:xfrm>
-            <a:off x="3810000" y="643972"/>
-            <a:ext cx="5410200" cy="7109639"/>
-          </a:xfrm>
-          <a:prstGeom prst="rect">
-            <a:avLst/>
-          </a:prstGeom>
-          <a:noFill/>
-        </p:spPr>
-        <p:txBody>
-          <a:bodyPr wrap="square" rtlCol="0">
-            <a:spAutoFit/>
-          </a:bodyPr>
-          <a:lstStyle/>
-          <a:p>
-            <a:pPr marL="342900" indent="-342900">
-              <a:buFont typeface="Arial" panose="020B0604020202020204" pitchFamily="34" charset="0"/>
-              <a:buChar char="•"/>
-              <a:defRPr/>
-            </a:pPr>
-            <a:r>
-              <a:rPr lang="en-US" dirty="0">
-                <a:solidFill>
-                  <a:srgbClr val="404040"/>
-                </a:solidFill>
-              </a:rPr>
-              <a:t>Run Chunk 5</a:t>
-            </a:r>
-          </a:p>
-          <a:p>
-            <a:pPr marL="800100" lvl="1" indent="-342900">
-              <a:buFont typeface="Arial" panose="020B0604020202020204" pitchFamily="34" charset="0"/>
-              <a:buChar char="•"/>
-              <a:defRPr/>
-            </a:pPr>
-            <a:r>
-              <a:rPr lang="en-US" dirty="0">
-                <a:solidFill>
-                  <a:srgbClr val="404040"/>
-                </a:solidFill>
-              </a:rPr>
-              <a:t>Run First Half – Loops through Every Combination of Columns and Computes Correlation</a:t>
-            </a:r>
-          </a:p>
-          <a:p>
-            <a:pPr marL="800100" lvl="1" indent="-342900">
-              <a:buFont typeface="Arial" panose="020B0604020202020204" pitchFamily="34" charset="0"/>
-              <a:buChar char="•"/>
-              <a:defRPr/>
-            </a:pPr>
-            <a:r>
-              <a:rPr lang="en-US" dirty="0">
-                <a:solidFill>
-                  <a:srgbClr val="404040"/>
-                </a:solidFill>
-              </a:rPr>
-              <a:t>Examine Second Half – Loops Through Every Combination of Columns Excluding the First Column</a:t>
-            </a:r>
-          </a:p>
-          <a:p>
-            <a:pPr marL="800100" lvl="1" indent="-342900">
-              <a:buFont typeface="Arial" panose="020B0604020202020204" pitchFamily="34" charset="0"/>
-              <a:buChar char="•"/>
-              <a:defRPr/>
-            </a:pPr>
-            <a:r>
-              <a:rPr lang="en-US" dirty="0">
-                <a:solidFill>
-                  <a:srgbClr val="404040"/>
-                </a:solidFill>
-              </a:rPr>
-              <a:t>Fill in Blanks with Appropriate Indices so Second Loop Works</a:t>
-            </a:r>
-          </a:p>
-          <a:p>
-            <a:pPr marL="800100" lvl="1" indent="-342900">
-              <a:buFont typeface="Arial" panose="020B0604020202020204" pitchFamily="34" charset="0"/>
-              <a:buChar char="•"/>
-              <a:defRPr/>
-            </a:pPr>
-            <a:r>
-              <a:rPr lang="en-US" dirty="0">
-                <a:solidFill>
-                  <a:srgbClr val="404040"/>
-                </a:solidFill>
-              </a:rPr>
-              <a:t>Run Second Half</a:t>
-            </a:r>
-          </a:p>
-          <a:p>
-            <a:pPr marL="800100" lvl="1" indent="-342900">
-              <a:buFont typeface="Arial" panose="020B0604020202020204" pitchFamily="34" charset="0"/>
-              <a:buChar char="•"/>
-              <a:defRPr/>
-            </a:pPr>
-            <a:endParaRPr lang="en-US" sz="1800" dirty="0">
-              <a:solidFill>
-                <a:srgbClr val="404040"/>
-              </a:solidFill>
-            </a:endParaRPr>
-          </a:p>
-          <a:p>
-            <a:pPr marL="342900" indent="-342900">
-              <a:buFont typeface="Arial" panose="020B0604020202020204" pitchFamily="34" charset="0"/>
-              <a:buChar char="•"/>
-              <a:defRPr/>
-            </a:pPr>
-            <a:r>
-              <a:rPr lang="en-US" dirty="0">
-                <a:solidFill>
-                  <a:srgbClr val="404040"/>
-                </a:solidFill>
-              </a:rPr>
-              <a:t>Run Chunk 6</a:t>
-            </a:r>
-          </a:p>
-          <a:p>
-            <a:pPr marL="800100" lvl="1" indent="-342900">
-              <a:buFont typeface="Arial" panose="020B0604020202020204" pitchFamily="34" charset="0"/>
-              <a:buChar char="•"/>
-              <a:defRPr/>
-            </a:pPr>
-            <a:r>
-              <a:rPr lang="en-US" dirty="0">
-                <a:solidFill>
-                  <a:srgbClr val="404040"/>
-                </a:solidFill>
-              </a:rPr>
-              <a:t>Inspect the Variables in HI</a:t>
-            </a:r>
-          </a:p>
-          <a:p>
-            <a:pPr marL="800100" lvl="1" indent="-342900">
-              <a:buFont typeface="Arial" panose="020B0604020202020204" pitchFamily="34" charset="0"/>
-              <a:buChar char="•"/>
-              <a:defRPr/>
-            </a:pPr>
-            <a:r>
-              <a:rPr lang="en-US" dirty="0">
-                <a:solidFill>
-                  <a:srgbClr val="404040"/>
-                </a:solidFill>
-              </a:rPr>
-              <a:t>Uncomment to Print Correlation Matrix</a:t>
-            </a:r>
-          </a:p>
-          <a:p>
-            <a:pPr marL="800100" lvl="1" indent="-342900">
-              <a:buFont typeface="Arial" panose="020B0604020202020204" pitchFamily="34" charset="0"/>
-              <a:buChar char="•"/>
-              <a:defRPr/>
-            </a:pPr>
-            <a:r>
-              <a:rPr lang="en-US" dirty="0">
-                <a:solidFill>
-                  <a:srgbClr val="404040"/>
-                </a:solidFill>
-              </a:rPr>
-              <a:t>What is the Problem?</a:t>
-            </a:r>
-          </a:p>
-          <a:p>
-            <a:pPr marL="800100" lvl="1" indent="-342900">
-              <a:buFont typeface="Arial" panose="020B0604020202020204" pitchFamily="34" charset="0"/>
-              <a:buChar char="•"/>
-              <a:defRPr/>
-            </a:pPr>
-            <a:endParaRPr lang="en-US" dirty="0">
-              <a:solidFill>
-                <a:srgbClr val="404040"/>
-              </a:solidFill>
-            </a:endParaRPr>
-          </a:p>
-          <a:p>
-            <a:pPr>
-              <a:defRPr/>
-            </a:pPr>
-            <a:endParaRPr lang="en-US" dirty="0">
-              <a:solidFill>
-                <a:srgbClr val="404040"/>
-              </a:solidFill>
-            </a:endParaRPr>
-          </a:p>
-        </p:txBody>
-      </p:sp>
-    </p:spTree>
-    <p:custDataLst>
-      <p:tags r:id="rId1"/>
-    </p:custDataLst>
-    <p:extLst>
-      <p:ext uri="{BB962C8B-B14F-4D97-AF65-F5344CB8AC3E}">
-        <p14:creationId xmlns:p14="http://schemas.microsoft.com/office/powerpoint/2010/main" val="3250074744"/>
-      </p:ext>
-    </p:extLst>
-  </p:cSld>
-  <p:clrMapOvr>
-    <a:masterClrMapping/>
-  </p:clrMapOvr>
-</p:sld>
-</file>
-
-<file path=ppt/slides/slide13.xml><?xml version="1.0" encoding="utf-8"?>
-<p:sld xmlns:a="http://schemas.openxmlformats.org/drawingml/2006/main" xmlns:r="http://schemas.openxmlformats.org/officeDocument/2006/relationships" xmlns:p="http://schemas.openxmlformats.org/presentationml/2006/main">
-  <p:cSld>
-    <p:bg>
-      <p:bgPr>
-        <a:solidFill>
-          <a:schemeClr val="bg1">
-            <a:lumMod val="85000"/>
-          </a:schemeClr>
-        </a:solidFill>
-        <a:effectLst/>
-      </p:bgPr>
-    </p:bg>
-    <p:spTree>
-      <p:nvGrpSpPr>
-        <p:cNvPr id="1" name=""/>
-        <p:cNvGrpSpPr/>
-        <p:nvPr/>
-      </p:nvGrpSpPr>
-      <p:grpSpPr>
-        <a:xfrm>
-          <a:off x="0" y="0"/>
-          <a:ext cx="0" cy="0"/>
-          <a:chOff x="0" y="0"/>
-          <a:chExt cx="0" cy="0"/>
-        </a:xfrm>
-      </p:grpSpPr>
-      <p:sp>
-        <p:nvSpPr>
-          <p:cNvPr id="15" name="Rectangle 12">
-            <a:extLst>
-              <a:ext uri="{FF2B5EF4-FFF2-40B4-BE49-F238E27FC236}">
-                <a16:creationId xmlns:a16="http://schemas.microsoft.com/office/drawing/2014/main" id="{867D4867-5BA7-4462-B2F6-A23F4A622AA7}"/>
-              </a:ext>
-              <a:ext uri="{C183D7F6-B498-43B3-948B-1728B52AA6E4}">
-                <adec:decorative xmlns:adec="http://schemas.microsoft.com/office/drawing/2017/decorative" val="1"/>
-              </a:ext>
-            </a:extLst>
-          </p:cNvPr>
-          <p:cNvSpPr>
-            <a:spLocks noGrp="1" noRot="1" noChangeAspect="1" noMove="1" noResize="1" noEditPoints="1" noAdjustHandles="1" noChangeArrowheads="1" noChangeShapeType="1" noTextEdit="1"/>
-          </p:cNvSpPr>
-          <p:nvPr>
-            <p:extLst>
-              <p:ext uri="{386F3935-93C4-4BCD-93E2-E3B085C9AB24}">
-                <p16:designElem xmlns:p16="http://schemas.microsoft.com/office/powerpoint/2015/main" val="1"/>
-              </p:ext>
-            </p:extLst>
-          </p:nvPr>
-        </p:nvSpPr>
-        <p:spPr>
-          <a:xfrm>
-            <a:off x="0" y="0"/>
-            <a:ext cx="3490722" cy="6858000"/>
-          </a:xfrm>
-          <a:prstGeom prst="rect">
-            <a:avLst/>
-          </a:prstGeom>
-          <a:solidFill>
-            <a:schemeClr val="tx1">
-              <a:lumMod val="75000"/>
-              <a:lumOff val="25000"/>
-            </a:schemeClr>
-          </a:solidFill>
-          <a:ln>
-            <a:noFill/>
-          </a:ln>
-        </p:spPr>
-        <p:style>
-          <a:lnRef idx="0">
-            <a:scrgbClr r="0" g="0" b="0"/>
-          </a:lnRef>
-          <a:fillRef idx="0">
-            <a:scrgbClr r="0" g="0" b="0"/>
-          </a:fillRef>
-          <a:effectRef idx="0">
-            <a:scrgbClr r="0" g="0" b="0"/>
-          </a:effectRef>
-          <a:fontRef idx="minor">
-            <a:schemeClr val="lt1"/>
-          </a:fontRef>
-        </p:style>
-        <p:txBody>
-          <a:bodyPr rtlCol="0" anchor="ctr"/>
-          <a:lstStyle/>
-          <a:p>
-            <a:pPr marL="0" marR="0" lvl="0" indent="0" algn="ctr" defTabSz="457200" rtl="0" eaLnBrk="1" fontAlgn="base" latinLnBrk="0" hangingPunct="1">
-              <a:lnSpc>
-                <a:spcPct val="100000"/>
-              </a:lnSpc>
-              <a:spcBef>
-                <a:spcPct val="0"/>
-              </a:spcBef>
-              <a:spcAft>
-                <a:spcPct val="0"/>
-              </a:spcAft>
-              <a:buClrTx/>
-              <a:buSzTx/>
-              <a:buFontTx/>
-              <a:buNone/>
-              <a:tabLst/>
-              <a:defRPr/>
-            </a:pPr>
-            <a:endParaRPr kumimoji="0" lang="en-US" sz="2400" b="0" i="0" u="none" strike="noStrike" kern="1200" cap="none" spc="0" normalizeH="0" baseline="0" noProof="0">
-              <a:ln>
-                <a:noFill/>
-              </a:ln>
-              <a:solidFill>
-                <a:prstClr val="white"/>
-              </a:solidFill>
-              <a:effectLst/>
-              <a:uLnTx/>
-              <a:uFillTx/>
-              <a:latin typeface="Calibri"/>
-              <a:ea typeface="+mn-ea"/>
-              <a:cs typeface="+mn-cs"/>
-            </a:endParaRPr>
-          </a:p>
-        </p:txBody>
-      </p:sp>
-      <p:sp>
-        <p:nvSpPr>
-          <p:cNvPr id="2" name="Title 1"/>
-          <p:cNvSpPr>
-            <a:spLocks noGrp="1"/>
-          </p:cNvSpPr>
-          <p:nvPr>
-            <p:ph type="title"/>
-          </p:nvPr>
-        </p:nvSpPr>
-        <p:spPr>
-          <a:xfrm>
-            <a:off x="482600" y="643467"/>
-            <a:ext cx="2522980" cy="1597315"/>
-          </a:xfrm>
-          <a:noFill/>
-          <a:ln w="19050">
-            <a:solidFill>
-              <a:schemeClr val="bg1"/>
-            </a:solidFill>
-          </a:ln>
-        </p:spPr>
-        <p:txBody>
-          <a:bodyPr vert="horz" wrap="square" lIns="91440" tIns="45720" rIns="91440" bIns="45720" rtlCol="0" anchor="ctr">
-            <a:normAutofit/>
-          </a:bodyPr>
-          <a:lstStyle/>
-          <a:p>
-            <a:pPr defTabSz="914400" eaLnBrk="1" hangingPunct="1">
-              <a:lnSpc>
-                <a:spcPct val="90000"/>
-              </a:lnSpc>
-            </a:pPr>
-            <a:r>
-              <a:rPr lang="en-US" sz="2400" dirty="0">
-                <a:solidFill>
-                  <a:schemeClr val="bg1"/>
-                </a:solidFill>
-              </a:rPr>
-              <a:t>Part 2: Loops</a:t>
-            </a:r>
-            <a:endParaRPr lang="en-US" sz="2400" kern="1200" dirty="0">
-              <a:solidFill>
-                <a:schemeClr val="bg1"/>
-              </a:solidFill>
-              <a:latin typeface="+mj-lt"/>
-              <a:ea typeface="+mj-ea"/>
-              <a:cs typeface="+mj-cs"/>
-            </a:endParaRPr>
-          </a:p>
-        </p:txBody>
-      </p:sp>
-      <p:pic>
-        <p:nvPicPr>
-          <p:cNvPr id="8" name="Picture 7">
-            <a:extLst>
-              <a:ext uri="{FF2B5EF4-FFF2-40B4-BE49-F238E27FC236}">
-                <a16:creationId xmlns:a16="http://schemas.microsoft.com/office/drawing/2014/main" id="{521D4292-9ECC-4DA5-8CC0-C561A0DA118E}"/>
-              </a:ext>
-            </a:extLst>
-          </p:cNvPr>
-          <p:cNvPicPr>
-            <a:picLocks noChangeAspect="1"/>
-          </p:cNvPicPr>
-          <p:nvPr/>
-        </p:nvPicPr>
-        <p:blipFill rotWithShape="1">
-          <a:blip r:embed="rId3"/>
-          <a:srcRect l="8000" r="9400"/>
-          <a:stretch/>
-        </p:blipFill>
-        <p:spPr>
-          <a:xfrm>
-            <a:off x="660103" y="3048000"/>
-            <a:ext cx="2167974" cy="2624666"/>
-          </a:xfrm>
-          <a:prstGeom prst="rect">
-            <a:avLst/>
-          </a:prstGeom>
-          <a:noFill/>
-        </p:spPr>
-      </p:pic>
-      <p:sp>
-        <p:nvSpPr>
-          <p:cNvPr id="6" name="TextBox 5">
-            <a:extLst>
-              <a:ext uri="{FF2B5EF4-FFF2-40B4-BE49-F238E27FC236}">
-                <a16:creationId xmlns:a16="http://schemas.microsoft.com/office/drawing/2014/main" id="{E58EF064-51FF-48A9-8810-E84BE6F6F09D}"/>
-              </a:ext>
-            </a:extLst>
-          </p:cNvPr>
-          <p:cNvSpPr txBox="1"/>
-          <p:nvPr/>
-        </p:nvSpPr>
-        <p:spPr>
-          <a:xfrm>
-            <a:off x="3781236" y="615207"/>
-            <a:ext cx="5286564" cy="4524315"/>
-          </a:xfrm>
-          <a:prstGeom prst="rect">
-            <a:avLst/>
-          </a:prstGeom>
-          <a:noFill/>
-        </p:spPr>
-        <p:txBody>
-          <a:bodyPr wrap="square" rtlCol="0">
-            <a:spAutoFit/>
-          </a:bodyPr>
-          <a:lstStyle/>
-          <a:p>
-            <a:pPr marL="342900" indent="-342900">
-              <a:buFont typeface="Arial" panose="020B0604020202020204" pitchFamily="34" charset="0"/>
-              <a:buChar char="•"/>
-              <a:defRPr/>
-            </a:pPr>
-            <a:r>
-              <a:rPr lang="en-US" dirty="0">
-                <a:solidFill>
-                  <a:srgbClr val="404040"/>
-                </a:solidFill>
-              </a:rPr>
-              <a:t>Run Chunk 7</a:t>
-            </a:r>
-          </a:p>
-          <a:p>
-            <a:pPr marL="800100" lvl="1" indent="-342900">
-              <a:buFont typeface="Arial" panose="020B0604020202020204" pitchFamily="34" charset="0"/>
-              <a:buChar char="•"/>
-              <a:defRPr/>
-            </a:pPr>
-            <a:r>
-              <a:rPr lang="en-US" dirty="0">
-                <a:solidFill>
-                  <a:srgbClr val="404040"/>
-                </a:solidFill>
-              </a:rPr>
-              <a:t>Observe the Difference Between the Printed Tibbles</a:t>
-            </a:r>
-          </a:p>
-          <a:p>
-            <a:pPr marL="800100" lvl="1" indent="-342900">
-              <a:buFont typeface="Arial" panose="020B0604020202020204" pitchFamily="34" charset="0"/>
-              <a:buChar char="•"/>
-              <a:defRPr/>
-            </a:pPr>
-            <a:r>
-              <a:rPr lang="en-US" dirty="0">
-                <a:solidFill>
-                  <a:srgbClr val="404040"/>
-                </a:solidFill>
-              </a:rPr>
-              <a:t>What is the Difference?</a:t>
-            </a:r>
-          </a:p>
-          <a:p>
-            <a:pPr marL="800100" lvl="1" indent="-342900">
-              <a:buFont typeface="Arial" panose="020B0604020202020204" pitchFamily="34" charset="0"/>
-              <a:buChar char="•"/>
-              <a:defRPr/>
-            </a:pPr>
-            <a:r>
-              <a:rPr lang="en-US" dirty="0">
-                <a:solidFill>
-                  <a:srgbClr val="404040"/>
-                </a:solidFill>
-              </a:rPr>
-              <a:t>How Would You Explain the First Loop to a Toddler?</a:t>
-            </a:r>
-          </a:p>
-          <a:p>
-            <a:pPr marL="800100" lvl="1" indent="-342900">
-              <a:buFont typeface="Arial" panose="020B0604020202020204" pitchFamily="34" charset="0"/>
-              <a:buChar char="•"/>
-              <a:defRPr/>
-            </a:pPr>
-            <a:r>
-              <a:rPr lang="en-US" dirty="0">
-                <a:solidFill>
-                  <a:srgbClr val="404040"/>
-                </a:solidFill>
-              </a:rPr>
-              <a:t>What is cat() doing?</a:t>
-            </a:r>
-          </a:p>
-          <a:p>
-            <a:pPr marL="800100" lvl="1" indent="-342900">
-              <a:buFont typeface="Arial" panose="020B0604020202020204" pitchFamily="34" charset="0"/>
-              <a:buChar char="•"/>
-              <a:defRPr/>
-            </a:pPr>
-            <a:r>
-              <a:rPr lang="en-US" dirty="0">
-                <a:solidFill>
-                  <a:srgbClr val="404040"/>
-                </a:solidFill>
-              </a:rPr>
-              <a:t>How Would You Explain the Second Loop to an Infant?</a:t>
-            </a:r>
-          </a:p>
-          <a:p>
-            <a:pPr marL="800100" lvl="1" indent="-342900">
-              <a:buFont typeface="Arial" panose="020B0604020202020204" pitchFamily="34" charset="0"/>
-              <a:buChar char="•"/>
-              <a:defRPr/>
-            </a:pPr>
-            <a:r>
-              <a:rPr lang="en-US" dirty="0">
-                <a:solidFill>
-                  <a:srgbClr val="404040"/>
-                </a:solidFill>
-              </a:rPr>
-              <a:t>Remember: There Are an Infinite Number of Ways to Do the Same Thing.</a:t>
-            </a:r>
-          </a:p>
-        </p:txBody>
-      </p:sp>
-    </p:spTree>
-    <p:custDataLst>
-      <p:tags r:id="rId1"/>
-    </p:custDataLst>
-    <p:extLst>
-      <p:ext uri="{BB962C8B-B14F-4D97-AF65-F5344CB8AC3E}">
-        <p14:creationId xmlns:p14="http://schemas.microsoft.com/office/powerpoint/2010/main" val="1837324169"/>
-      </p:ext>
-    </p:extLst>
-  </p:cSld>
-  <p:clrMapOvr>
-    <a:masterClrMapping/>
-  </p:clrMapOvr>
-</p:sld>
-</file>
-
-<file path=ppt/slides/slide14.xml><?xml version="1.0" encoding="utf-8"?>
-<p:sld xmlns:a="http://schemas.openxmlformats.org/drawingml/2006/main" xmlns:r="http://schemas.openxmlformats.org/officeDocument/2006/relationships" xmlns:p="http://schemas.openxmlformats.org/presentationml/2006/main">
-  <p:cSld>
-    <p:bg>
-      <p:bgPr>
-        <a:solidFill>
-          <a:schemeClr val="bg1">
-            <a:lumMod val="85000"/>
-          </a:schemeClr>
-        </a:solidFill>
-        <a:effectLst/>
-      </p:bgPr>
-    </p:bg>
-    <p:spTree>
-      <p:nvGrpSpPr>
-        <p:cNvPr id="1" name=""/>
-        <p:cNvGrpSpPr/>
-        <p:nvPr/>
-      </p:nvGrpSpPr>
-      <p:grpSpPr>
-        <a:xfrm>
-          <a:off x="0" y="0"/>
-          <a:ext cx="0" cy="0"/>
-          <a:chOff x="0" y="0"/>
-          <a:chExt cx="0" cy="0"/>
-        </a:xfrm>
-      </p:grpSpPr>
-      <p:sp>
-        <p:nvSpPr>
-          <p:cNvPr id="15" name="Rectangle 12">
-            <a:extLst>
-              <a:ext uri="{FF2B5EF4-FFF2-40B4-BE49-F238E27FC236}">
-                <a16:creationId xmlns:a16="http://schemas.microsoft.com/office/drawing/2014/main" id="{867D4867-5BA7-4462-B2F6-A23F4A622AA7}"/>
-              </a:ext>
-              <a:ext uri="{C183D7F6-B498-43B3-948B-1728B52AA6E4}">
-                <adec:decorative xmlns:adec="http://schemas.microsoft.com/office/drawing/2017/decorative" val="1"/>
-              </a:ext>
-            </a:extLst>
-          </p:cNvPr>
-          <p:cNvSpPr>
-            <a:spLocks noGrp="1" noRot="1" noChangeAspect="1" noMove="1" noResize="1" noEditPoints="1" noAdjustHandles="1" noChangeArrowheads="1" noChangeShapeType="1" noTextEdit="1"/>
-          </p:cNvSpPr>
-          <p:nvPr>
-            <p:extLst>
-              <p:ext uri="{386F3935-93C4-4BCD-93E2-E3B085C9AB24}">
-                <p16:designElem xmlns:p16="http://schemas.microsoft.com/office/powerpoint/2015/main" val="1"/>
-              </p:ext>
-            </p:extLst>
-          </p:nvPr>
-        </p:nvSpPr>
-        <p:spPr>
-          <a:xfrm>
-            <a:off x="0" y="0"/>
-            <a:ext cx="3490722" cy="6858000"/>
-          </a:xfrm>
-          <a:prstGeom prst="rect">
-            <a:avLst/>
-          </a:prstGeom>
-          <a:solidFill>
-            <a:schemeClr val="tx1">
-              <a:lumMod val="75000"/>
-              <a:lumOff val="25000"/>
-            </a:schemeClr>
-          </a:solidFill>
-          <a:ln>
-            <a:noFill/>
-          </a:ln>
-        </p:spPr>
-        <p:style>
-          <a:lnRef idx="0">
-            <a:scrgbClr r="0" g="0" b="0"/>
-          </a:lnRef>
-          <a:fillRef idx="0">
-            <a:scrgbClr r="0" g="0" b="0"/>
-          </a:fillRef>
-          <a:effectRef idx="0">
-            <a:scrgbClr r="0" g="0" b="0"/>
-          </a:effectRef>
-          <a:fontRef idx="minor">
-            <a:schemeClr val="lt1"/>
-          </a:fontRef>
-        </p:style>
-        <p:txBody>
-          <a:bodyPr rtlCol="0" anchor="ctr"/>
-          <a:lstStyle/>
-          <a:p>
-            <a:pPr marL="0" marR="0" lvl="0" indent="0" algn="ctr" defTabSz="457200" rtl="0" eaLnBrk="1" fontAlgn="base" latinLnBrk="0" hangingPunct="1">
-              <a:lnSpc>
-                <a:spcPct val="100000"/>
-              </a:lnSpc>
-              <a:spcBef>
-                <a:spcPct val="0"/>
-              </a:spcBef>
-              <a:spcAft>
-                <a:spcPct val="0"/>
-              </a:spcAft>
-              <a:buClrTx/>
-              <a:buSzTx/>
-              <a:buFontTx/>
-              <a:buNone/>
-              <a:tabLst/>
-              <a:defRPr/>
-            </a:pPr>
-            <a:endParaRPr kumimoji="0" lang="en-US" sz="2400" b="0" i="0" u="none" strike="noStrike" kern="1200" cap="none" spc="0" normalizeH="0" baseline="0" noProof="0">
-              <a:ln>
-                <a:noFill/>
-              </a:ln>
-              <a:solidFill>
-                <a:prstClr val="white"/>
-              </a:solidFill>
-              <a:effectLst/>
-              <a:uLnTx/>
-              <a:uFillTx/>
-              <a:latin typeface="Calibri"/>
-              <a:ea typeface="+mn-ea"/>
-              <a:cs typeface="+mn-cs"/>
-            </a:endParaRPr>
-          </a:p>
-        </p:txBody>
-      </p:sp>
-      <p:sp>
-        <p:nvSpPr>
-          <p:cNvPr id="2" name="Title 1"/>
-          <p:cNvSpPr>
-            <a:spLocks noGrp="1"/>
-          </p:cNvSpPr>
-          <p:nvPr>
-            <p:ph type="title"/>
-          </p:nvPr>
-        </p:nvSpPr>
-        <p:spPr>
-          <a:xfrm>
-            <a:off x="482600" y="643467"/>
-            <a:ext cx="2522980" cy="1597315"/>
-          </a:xfrm>
-          <a:noFill/>
-          <a:ln w="19050">
-            <a:solidFill>
-              <a:schemeClr val="bg1"/>
-            </a:solidFill>
-          </a:ln>
-        </p:spPr>
-        <p:txBody>
-          <a:bodyPr vert="horz" wrap="square" lIns="91440" tIns="45720" rIns="91440" bIns="45720" rtlCol="0" anchor="ctr">
-            <a:normAutofit/>
-          </a:bodyPr>
-          <a:lstStyle/>
-          <a:p>
-            <a:pPr defTabSz="914400" eaLnBrk="1" hangingPunct="1">
-              <a:lnSpc>
-                <a:spcPct val="90000"/>
-              </a:lnSpc>
-            </a:pPr>
-            <a:r>
-              <a:rPr lang="en-US" sz="2400" dirty="0">
-                <a:solidFill>
-                  <a:schemeClr val="bg1"/>
-                </a:solidFill>
-              </a:rPr>
-              <a:t>Part 3: SRS</a:t>
-            </a:r>
-            <a:endParaRPr lang="en-US" sz="2400" kern="1200" dirty="0">
-              <a:solidFill>
-                <a:schemeClr val="bg1"/>
-              </a:solidFill>
-              <a:latin typeface="+mj-lt"/>
-              <a:ea typeface="+mj-ea"/>
-              <a:cs typeface="+mj-cs"/>
-            </a:endParaRPr>
-          </a:p>
-        </p:txBody>
-      </p:sp>
-      <p:pic>
-        <p:nvPicPr>
-          <p:cNvPr id="8" name="Picture 7">
-            <a:extLst>
-              <a:ext uri="{FF2B5EF4-FFF2-40B4-BE49-F238E27FC236}">
-                <a16:creationId xmlns:a16="http://schemas.microsoft.com/office/drawing/2014/main" id="{521D4292-9ECC-4DA5-8CC0-C561A0DA118E}"/>
-              </a:ext>
-            </a:extLst>
-          </p:cNvPr>
-          <p:cNvPicPr>
-            <a:picLocks noChangeAspect="1"/>
-          </p:cNvPicPr>
-          <p:nvPr/>
-        </p:nvPicPr>
-        <p:blipFill rotWithShape="1">
-          <a:blip r:embed="rId3"/>
-          <a:srcRect l="8000" r="9400"/>
-          <a:stretch/>
-        </p:blipFill>
-        <p:spPr>
-          <a:xfrm>
-            <a:off x="660103" y="3048000"/>
-            <a:ext cx="2167974" cy="2624666"/>
-          </a:xfrm>
-          <a:prstGeom prst="rect">
-            <a:avLst/>
-          </a:prstGeom>
-          <a:noFill/>
-        </p:spPr>
-      </p:pic>
-      <p:pic>
-        <p:nvPicPr>
-          <p:cNvPr id="3" name="Picture 2">
-            <a:extLst>
-              <a:ext uri="{FF2B5EF4-FFF2-40B4-BE49-F238E27FC236}">
-                <a16:creationId xmlns:a16="http://schemas.microsoft.com/office/drawing/2014/main" id="{332756A3-4863-46A7-9FBC-B23BD3F74BFC}"/>
-              </a:ext>
-            </a:extLst>
-          </p:cNvPr>
-          <p:cNvPicPr>
-            <a:picLocks noChangeAspect="1"/>
-          </p:cNvPicPr>
-          <p:nvPr/>
-        </p:nvPicPr>
-        <p:blipFill>
-          <a:blip r:embed="rId4"/>
-          <a:stretch>
-            <a:fillRect/>
-          </a:stretch>
-        </p:blipFill>
-        <p:spPr>
-          <a:xfrm>
-            <a:off x="3585972" y="1818409"/>
-            <a:ext cx="5481828" cy="1257300"/>
-          </a:xfrm>
-          <a:prstGeom prst="rect">
-            <a:avLst/>
-          </a:prstGeom>
-          <a:ln>
-            <a:solidFill>
-              <a:srgbClr val="404040"/>
-            </a:solidFill>
-          </a:ln>
-        </p:spPr>
-        <p:style>
-          <a:lnRef idx="2">
-            <a:schemeClr val="dk1"/>
-          </a:lnRef>
-          <a:fillRef idx="1">
-            <a:schemeClr val="lt1"/>
-          </a:fillRef>
-          <a:effectRef idx="0">
-            <a:schemeClr val="dk1"/>
-          </a:effectRef>
-          <a:fontRef idx="minor">
-            <a:schemeClr val="dk1"/>
-          </a:fontRef>
-        </p:style>
-      </p:pic>
-      <p:sp>
-        <p:nvSpPr>
-          <p:cNvPr id="6" name="TextBox 5">
-            <a:extLst>
-              <a:ext uri="{FF2B5EF4-FFF2-40B4-BE49-F238E27FC236}">
-                <a16:creationId xmlns:a16="http://schemas.microsoft.com/office/drawing/2014/main" id="{FC3DAEC3-3D5E-498E-BFE9-14205272B253}"/>
-              </a:ext>
-            </a:extLst>
-          </p:cNvPr>
-          <p:cNvSpPr txBox="1"/>
-          <p:nvPr/>
-        </p:nvSpPr>
-        <p:spPr>
-          <a:xfrm>
-            <a:off x="3781236" y="615207"/>
-            <a:ext cx="5286564" cy="6278642"/>
-          </a:xfrm>
-          <a:prstGeom prst="rect">
-            <a:avLst/>
-          </a:prstGeom>
-          <a:noFill/>
-        </p:spPr>
-        <p:txBody>
-          <a:bodyPr wrap="square" rtlCol="0">
-            <a:spAutoFit/>
-          </a:bodyPr>
-          <a:lstStyle/>
-          <a:p>
-            <a:pPr marL="342900" indent="-342900">
-              <a:buFont typeface="Arial" panose="020B0604020202020204" pitchFamily="34" charset="0"/>
-              <a:buChar char="•"/>
-              <a:defRPr/>
-            </a:pPr>
-            <a:r>
-              <a:rPr lang="en-US" dirty="0">
-                <a:solidFill>
-                  <a:srgbClr val="404040"/>
-                </a:solidFill>
-              </a:rPr>
-              <a:t>Important For Simulation Studies</a:t>
-            </a:r>
-          </a:p>
-          <a:p>
-            <a:pPr marL="342900" indent="-342900">
-              <a:buFont typeface="Arial" panose="020B0604020202020204" pitchFamily="34" charset="0"/>
-              <a:buChar char="•"/>
-              <a:defRPr/>
-            </a:pPr>
-            <a:endParaRPr lang="en-US" dirty="0">
-              <a:solidFill>
-                <a:srgbClr val="404040"/>
-              </a:solidFill>
-            </a:endParaRPr>
-          </a:p>
-          <a:p>
-            <a:pPr marL="342900" indent="-342900">
-              <a:buFont typeface="Arial" panose="020B0604020202020204" pitchFamily="34" charset="0"/>
-              <a:buChar char="•"/>
-              <a:defRPr/>
-            </a:pPr>
-            <a:r>
-              <a:rPr lang="en-US" dirty="0">
-                <a:solidFill>
-                  <a:srgbClr val="404040"/>
-                </a:solidFill>
-              </a:rPr>
-              <a:t>Known Distributions</a:t>
-            </a:r>
-          </a:p>
-          <a:p>
-            <a:pPr marL="342900" indent="-342900">
-              <a:buFont typeface="Arial" panose="020B0604020202020204" pitchFamily="34" charset="0"/>
-              <a:buChar char="•"/>
-              <a:defRPr/>
-            </a:pPr>
-            <a:endParaRPr lang="en-US" sz="1800" dirty="0">
-              <a:solidFill>
-                <a:srgbClr val="404040"/>
-              </a:solidFill>
-            </a:endParaRPr>
-          </a:p>
-          <a:p>
-            <a:pPr marL="342900" indent="-342900">
-              <a:buFont typeface="Arial" panose="020B0604020202020204" pitchFamily="34" charset="0"/>
-              <a:buChar char="•"/>
-              <a:defRPr/>
-            </a:pPr>
-            <a:endParaRPr lang="en-US" dirty="0">
-              <a:solidFill>
-                <a:srgbClr val="404040"/>
-              </a:solidFill>
-            </a:endParaRPr>
-          </a:p>
-          <a:p>
-            <a:pPr marL="342900" indent="-342900">
-              <a:buFont typeface="Arial" panose="020B0604020202020204" pitchFamily="34" charset="0"/>
-              <a:buChar char="•"/>
-              <a:defRPr/>
-            </a:pPr>
-            <a:endParaRPr lang="en-US" dirty="0">
-              <a:solidFill>
-                <a:srgbClr val="404040"/>
-              </a:solidFill>
-            </a:endParaRPr>
-          </a:p>
-          <a:p>
-            <a:pPr marL="342900" indent="-342900">
-              <a:buFont typeface="Arial" panose="020B0604020202020204" pitchFamily="34" charset="0"/>
-              <a:buChar char="•"/>
-              <a:defRPr/>
-            </a:pPr>
-            <a:endParaRPr lang="en-US" dirty="0">
-              <a:solidFill>
-                <a:srgbClr val="404040"/>
-              </a:solidFill>
-            </a:endParaRPr>
-          </a:p>
-          <a:p>
-            <a:pPr marL="800100" lvl="1" indent="-342900">
-              <a:buFont typeface="Arial" panose="020B0604020202020204" pitchFamily="34" charset="0"/>
-              <a:buChar char="•"/>
-              <a:defRPr/>
-            </a:pPr>
-            <a:r>
-              <a:rPr lang="en-US" dirty="0">
-                <a:solidFill>
-                  <a:srgbClr val="404040"/>
-                </a:solidFill>
-              </a:rPr>
-              <a:t>“d” -&gt; Useful for Plotting Density Curve for Continuous Variables or Probability Mass Function for Discrete Variables</a:t>
-            </a:r>
-          </a:p>
-          <a:p>
-            <a:pPr marL="800100" lvl="1" indent="-342900">
-              <a:buFont typeface="Arial" panose="020B0604020202020204" pitchFamily="34" charset="0"/>
-              <a:buChar char="•"/>
-              <a:defRPr/>
-            </a:pPr>
-            <a:r>
-              <a:rPr lang="en-US" dirty="0">
-                <a:solidFill>
-                  <a:srgbClr val="404040"/>
-                </a:solidFill>
-              </a:rPr>
-              <a:t>“p” -&gt; Finds the Probability Less Than Or Equal to a Given Number</a:t>
-            </a:r>
-          </a:p>
-          <a:p>
-            <a:pPr marL="800100" lvl="1" indent="-342900">
-              <a:buFont typeface="Arial" panose="020B0604020202020204" pitchFamily="34" charset="0"/>
-              <a:buChar char="•"/>
-              <a:defRPr/>
-            </a:pPr>
-            <a:r>
-              <a:rPr lang="en-US" dirty="0">
-                <a:solidFill>
-                  <a:srgbClr val="404040"/>
-                </a:solidFill>
-              </a:rPr>
-              <a:t>“q” -&gt; Finds Cutoff Points</a:t>
-            </a:r>
-          </a:p>
-          <a:p>
-            <a:pPr marL="800100" lvl="1" indent="-342900">
-              <a:buFont typeface="Arial" panose="020B0604020202020204" pitchFamily="34" charset="0"/>
-              <a:buChar char="•"/>
-              <a:defRPr/>
-            </a:pPr>
-            <a:r>
-              <a:rPr lang="en-US" dirty="0">
-                <a:solidFill>
-                  <a:srgbClr val="404040"/>
-                </a:solidFill>
-              </a:rPr>
-              <a:t>“r” -&gt; Generates a Random Sample from the Distribution</a:t>
-            </a:r>
-          </a:p>
-        </p:txBody>
-      </p:sp>
-    </p:spTree>
-    <p:custDataLst>
-      <p:tags r:id="rId1"/>
-    </p:custDataLst>
-    <p:extLst>
-      <p:ext uri="{BB962C8B-B14F-4D97-AF65-F5344CB8AC3E}">
-        <p14:creationId xmlns:p14="http://schemas.microsoft.com/office/powerpoint/2010/main" val="199654673"/>
-      </p:ext>
-    </p:extLst>
-  </p:cSld>
-  <p:clrMapOvr>
-    <a:masterClrMapping/>
-  </p:clrMapOvr>
-</p:sld>
-</file>
-
-<file path=ppt/slides/slide15.xml><?xml version="1.0" encoding="utf-8"?>
-<p:sld xmlns:a="http://schemas.openxmlformats.org/drawingml/2006/main" xmlns:r="http://schemas.openxmlformats.org/officeDocument/2006/relationships" xmlns:p="http://schemas.openxmlformats.org/presentationml/2006/main">
-  <p:cSld>
-    <p:bg>
-      <p:bgPr>
-        <a:solidFill>
-          <a:schemeClr val="bg1">
-            <a:lumMod val="85000"/>
-          </a:schemeClr>
-        </a:solidFill>
-        <a:effectLst/>
-      </p:bgPr>
-    </p:bg>
-    <p:spTree>
-      <p:nvGrpSpPr>
-        <p:cNvPr id="1" name=""/>
-        <p:cNvGrpSpPr/>
-        <p:nvPr/>
-      </p:nvGrpSpPr>
-      <p:grpSpPr>
-        <a:xfrm>
-          <a:off x="0" y="0"/>
-          <a:ext cx="0" cy="0"/>
-          <a:chOff x="0" y="0"/>
-          <a:chExt cx="0" cy="0"/>
-        </a:xfrm>
-      </p:grpSpPr>
-      <p:sp>
-        <p:nvSpPr>
-          <p:cNvPr id="15" name="Rectangle 12">
-            <a:extLst>
-              <a:ext uri="{FF2B5EF4-FFF2-40B4-BE49-F238E27FC236}">
-                <a16:creationId xmlns:a16="http://schemas.microsoft.com/office/drawing/2014/main" id="{867D4867-5BA7-4462-B2F6-A23F4A622AA7}"/>
-              </a:ext>
-              <a:ext uri="{C183D7F6-B498-43B3-948B-1728B52AA6E4}">
-                <adec:decorative xmlns:adec="http://schemas.microsoft.com/office/drawing/2017/decorative" val="1"/>
-              </a:ext>
-            </a:extLst>
-          </p:cNvPr>
-          <p:cNvSpPr>
-            <a:spLocks noGrp="1" noRot="1" noChangeAspect="1" noMove="1" noResize="1" noEditPoints="1" noAdjustHandles="1" noChangeArrowheads="1" noChangeShapeType="1" noTextEdit="1"/>
-          </p:cNvSpPr>
-          <p:nvPr>
-            <p:extLst>
-              <p:ext uri="{386F3935-93C4-4BCD-93E2-E3B085C9AB24}">
-                <p16:designElem xmlns:p16="http://schemas.microsoft.com/office/powerpoint/2015/main" val="1"/>
-              </p:ext>
-            </p:extLst>
-          </p:nvPr>
-        </p:nvSpPr>
-        <p:spPr>
-          <a:xfrm>
-            <a:off x="0" y="0"/>
-            <a:ext cx="3490722" cy="6858000"/>
-          </a:xfrm>
-          <a:prstGeom prst="rect">
-            <a:avLst/>
-          </a:prstGeom>
-          <a:solidFill>
-            <a:schemeClr val="tx1">
-              <a:lumMod val="75000"/>
-              <a:lumOff val="25000"/>
-            </a:schemeClr>
-          </a:solidFill>
-          <a:ln>
-            <a:noFill/>
-          </a:ln>
-        </p:spPr>
-        <p:style>
-          <a:lnRef idx="0">
-            <a:scrgbClr r="0" g="0" b="0"/>
-          </a:lnRef>
-          <a:fillRef idx="0">
-            <a:scrgbClr r="0" g="0" b="0"/>
-          </a:fillRef>
-          <a:effectRef idx="0">
-            <a:scrgbClr r="0" g="0" b="0"/>
-          </a:effectRef>
-          <a:fontRef idx="minor">
-            <a:schemeClr val="lt1"/>
-          </a:fontRef>
-        </p:style>
-        <p:txBody>
-          <a:bodyPr rtlCol="0" anchor="ctr"/>
-          <a:lstStyle/>
-          <a:p>
-            <a:pPr marL="0" marR="0" lvl="0" indent="0" algn="ctr" defTabSz="457200" rtl="0" eaLnBrk="1" fontAlgn="base" latinLnBrk="0" hangingPunct="1">
-              <a:lnSpc>
-                <a:spcPct val="100000"/>
-              </a:lnSpc>
-              <a:spcBef>
-                <a:spcPct val="0"/>
-              </a:spcBef>
-              <a:spcAft>
-                <a:spcPct val="0"/>
-              </a:spcAft>
-              <a:buClrTx/>
-              <a:buSzTx/>
-              <a:buFontTx/>
-              <a:buNone/>
-              <a:tabLst/>
-              <a:defRPr/>
-            </a:pPr>
-            <a:endParaRPr kumimoji="0" lang="en-US" sz="2400" b="0" i="0" u="none" strike="noStrike" kern="1200" cap="none" spc="0" normalizeH="0" baseline="0" noProof="0">
-              <a:ln>
-                <a:noFill/>
-              </a:ln>
-              <a:solidFill>
-                <a:prstClr val="white"/>
-              </a:solidFill>
-              <a:effectLst/>
-              <a:uLnTx/>
-              <a:uFillTx/>
-              <a:latin typeface="Calibri"/>
-              <a:ea typeface="+mn-ea"/>
-              <a:cs typeface="+mn-cs"/>
-            </a:endParaRPr>
-          </a:p>
-        </p:txBody>
-      </p:sp>
-      <p:sp>
-        <p:nvSpPr>
-          <p:cNvPr id="2" name="Title 1"/>
-          <p:cNvSpPr>
-            <a:spLocks noGrp="1"/>
-          </p:cNvSpPr>
-          <p:nvPr>
-            <p:ph type="title"/>
-          </p:nvPr>
-        </p:nvSpPr>
-        <p:spPr>
-          <a:xfrm>
-            <a:off x="482600" y="643467"/>
-            <a:ext cx="2522980" cy="1597315"/>
-          </a:xfrm>
-          <a:noFill/>
-          <a:ln w="19050">
-            <a:solidFill>
-              <a:schemeClr val="bg1"/>
-            </a:solidFill>
-          </a:ln>
-        </p:spPr>
-        <p:txBody>
-          <a:bodyPr vert="horz" wrap="square" lIns="91440" tIns="45720" rIns="91440" bIns="45720" rtlCol="0" anchor="ctr">
-            <a:normAutofit/>
-          </a:bodyPr>
-          <a:lstStyle/>
-          <a:p>
-            <a:pPr defTabSz="914400" eaLnBrk="1" hangingPunct="1">
-              <a:lnSpc>
-                <a:spcPct val="90000"/>
-              </a:lnSpc>
-            </a:pPr>
-            <a:r>
-              <a:rPr lang="en-US" sz="2400" dirty="0">
-                <a:solidFill>
-                  <a:schemeClr val="bg1"/>
-                </a:solidFill>
-              </a:rPr>
-              <a:t>Part 3: SRS</a:t>
-            </a:r>
-            <a:endParaRPr lang="en-US" sz="2400" kern="1200" dirty="0">
-              <a:solidFill>
-                <a:schemeClr val="bg1"/>
-              </a:solidFill>
-              <a:latin typeface="+mj-lt"/>
-              <a:ea typeface="+mj-ea"/>
-              <a:cs typeface="+mj-cs"/>
-            </a:endParaRPr>
-          </a:p>
-        </p:txBody>
-      </p:sp>
-      <p:pic>
-        <p:nvPicPr>
-          <p:cNvPr id="8" name="Picture 7">
-            <a:extLst>
-              <a:ext uri="{FF2B5EF4-FFF2-40B4-BE49-F238E27FC236}">
-                <a16:creationId xmlns:a16="http://schemas.microsoft.com/office/drawing/2014/main" id="{521D4292-9ECC-4DA5-8CC0-C561A0DA118E}"/>
-              </a:ext>
-            </a:extLst>
-          </p:cNvPr>
-          <p:cNvPicPr>
-            <a:picLocks noChangeAspect="1"/>
-          </p:cNvPicPr>
-          <p:nvPr/>
-        </p:nvPicPr>
-        <p:blipFill rotWithShape="1">
-          <a:blip r:embed="rId3"/>
-          <a:srcRect l="8000" r="9400"/>
-          <a:stretch/>
-        </p:blipFill>
-        <p:spPr>
-          <a:xfrm>
-            <a:off x="660103" y="3048000"/>
-            <a:ext cx="2167974" cy="2624666"/>
-          </a:xfrm>
-          <a:prstGeom prst="rect">
-            <a:avLst/>
-          </a:prstGeom>
-          <a:noFill/>
-        </p:spPr>
-      </p:pic>
-      <p:sp>
-        <p:nvSpPr>
-          <p:cNvPr id="6" name="TextBox 5">
-            <a:extLst>
-              <a:ext uri="{FF2B5EF4-FFF2-40B4-BE49-F238E27FC236}">
-                <a16:creationId xmlns:a16="http://schemas.microsoft.com/office/drawing/2014/main" id="{FC3DAEC3-3D5E-498E-BFE9-14205272B253}"/>
-              </a:ext>
-            </a:extLst>
-          </p:cNvPr>
-          <p:cNvSpPr txBox="1"/>
-          <p:nvPr/>
-        </p:nvSpPr>
-        <p:spPr>
-          <a:xfrm>
-            <a:off x="3781236" y="615207"/>
-            <a:ext cx="5286564" cy="6001643"/>
-          </a:xfrm>
-          <a:prstGeom prst="rect">
-            <a:avLst/>
-          </a:prstGeom>
-          <a:noFill/>
-        </p:spPr>
-        <p:txBody>
-          <a:bodyPr wrap="square" rtlCol="0">
-            <a:spAutoFit/>
-          </a:bodyPr>
-          <a:lstStyle/>
-          <a:p>
-            <a:pPr marL="342900" indent="-342900">
-              <a:buFont typeface="Arial" panose="020B0604020202020204" pitchFamily="34" charset="0"/>
-              <a:buChar char="•"/>
-              <a:defRPr/>
-            </a:pPr>
-            <a:r>
-              <a:rPr lang="en-US" dirty="0">
-                <a:solidFill>
-                  <a:srgbClr val="404040"/>
-                </a:solidFill>
-              </a:rPr>
-              <a:t>For SRS, Use “r”</a:t>
-            </a:r>
-          </a:p>
-          <a:p>
-            <a:pPr marL="342900" indent="-342900">
-              <a:buFont typeface="Arial" panose="020B0604020202020204" pitchFamily="34" charset="0"/>
-              <a:buChar char="•"/>
-              <a:defRPr/>
-            </a:pPr>
-            <a:endParaRPr lang="en-US" dirty="0">
-              <a:solidFill>
-                <a:srgbClr val="404040"/>
-              </a:solidFill>
-            </a:endParaRPr>
-          </a:p>
-          <a:p>
-            <a:pPr marL="342900" indent="-342900">
-              <a:buFont typeface="Arial" panose="020B0604020202020204" pitchFamily="34" charset="0"/>
-              <a:buChar char="•"/>
-              <a:defRPr/>
-            </a:pPr>
-            <a:r>
-              <a:rPr lang="en-US" dirty="0">
-                <a:solidFill>
-                  <a:srgbClr val="404040"/>
-                </a:solidFill>
-              </a:rPr>
-              <a:t>Run Chunk 1</a:t>
-            </a:r>
-          </a:p>
-          <a:p>
-            <a:pPr marL="800100" lvl="1" indent="-342900">
-              <a:buFont typeface="Arial" panose="020B0604020202020204" pitchFamily="34" charset="0"/>
-              <a:buChar char="•"/>
-              <a:defRPr/>
-            </a:pPr>
-            <a:r>
-              <a:rPr lang="en-US" dirty="0">
-                <a:solidFill>
-                  <a:srgbClr val="404040"/>
-                </a:solidFill>
-              </a:rPr>
-              <a:t>Scenario for x1: You Ask BLANK Number of Students There Grades where Grades Follow a Normal Distribution with Mean=82 and SD=2</a:t>
-            </a:r>
-          </a:p>
-          <a:p>
-            <a:pPr lvl="1">
-              <a:defRPr/>
-            </a:pPr>
-            <a:endParaRPr lang="en-US" dirty="0">
-              <a:solidFill>
-                <a:srgbClr val="404040"/>
-              </a:solidFill>
-            </a:endParaRPr>
-          </a:p>
-          <a:p>
-            <a:pPr marL="800100" lvl="1" indent="-342900">
-              <a:buFont typeface="Arial" panose="020B0604020202020204" pitchFamily="34" charset="0"/>
-              <a:buChar char="•"/>
-              <a:defRPr/>
-            </a:pPr>
-            <a:r>
-              <a:rPr lang="en-US" dirty="0">
-                <a:solidFill>
-                  <a:srgbClr val="404040"/>
-                </a:solidFill>
-              </a:rPr>
-              <a:t>Scenario for x2: You Ask BLANK Number of Students to Roll a Fair Die 10 Times and Tell You the Number of 6’s that Appeared.</a:t>
-            </a:r>
-          </a:p>
-          <a:p>
-            <a:pPr marL="800100" lvl="1" indent="-342900">
-              <a:buFont typeface="Arial" panose="020B0604020202020204" pitchFamily="34" charset="0"/>
-              <a:buChar char="•"/>
-              <a:defRPr/>
-            </a:pPr>
-            <a:endParaRPr lang="en-US" dirty="0">
-              <a:solidFill>
-                <a:srgbClr val="404040"/>
-              </a:solidFill>
-            </a:endParaRPr>
-          </a:p>
-          <a:p>
-            <a:pPr marL="800100" lvl="1" indent="-342900">
-              <a:buFont typeface="Arial" panose="020B0604020202020204" pitchFamily="34" charset="0"/>
-              <a:buChar char="•"/>
-              <a:defRPr/>
-            </a:pPr>
-            <a:r>
-              <a:rPr lang="en-US" dirty="0">
-                <a:solidFill>
-                  <a:srgbClr val="404040"/>
-                </a:solidFill>
-              </a:rPr>
-              <a:t>Try Small and Large for BLANK</a:t>
-            </a:r>
-          </a:p>
-        </p:txBody>
-      </p:sp>
-    </p:spTree>
-    <p:custDataLst>
-      <p:tags r:id="rId1"/>
-    </p:custDataLst>
-    <p:extLst>
-      <p:ext uri="{BB962C8B-B14F-4D97-AF65-F5344CB8AC3E}">
-        <p14:creationId xmlns:p14="http://schemas.microsoft.com/office/powerpoint/2010/main" val="3637524151"/>
-      </p:ext>
-    </p:extLst>
-  </p:cSld>
-  <p:clrMapOvr>
-    <a:masterClrMapping/>
-  </p:clrMapOvr>
-</p:sld>
-</file>
-
-<file path=ppt/slides/slide16.xml><?xml version="1.0" encoding="utf-8"?>
-<p:sld xmlns:a="http://schemas.openxmlformats.org/drawingml/2006/main" xmlns:r="http://schemas.openxmlformats.org/officeDocument/2006/relationships" xmlns:p="http://schemas.openxmlformats.org/presentationml/2006/main">
-  <p:cSld>
-    <p:bg>
-      <p:bgPr>
-        <a:solidFill>
-          <a:schemeClr val="bg1">
-            <a:lumMod val="85000"/>
-          </a:schemeClr>
-        </a:solidFill>
-        <a:effectLst/>
-      </p:bgPr>
-    </p:bg>
-    <p:spTree>
-      <p:nvGrpSpPr>
-        <p:cNvPr id="1" name=""/>
-        <p:cNvGrpSpPr/>
-        <p:nvPr/>
-      </p:nvGrpSpPr>
-      <p:grpSpPr>
-        <a:xfrm>
-          <a:off x="0" y="0"/>
-          <a:ext cx="0" cy="0"/>
-          <a:chOff x="0" y="0"/>
-          <a:chExt cx="0" cy="0"/>
-        </a:xfrm>
-      </p:grpSpPr>
-      <p:sp>
-        <p:nvSpPr>
-          <p:cNvPr id="15" name="Rectangle 12">
-            <a:extLst>
-              <a:ext uri="{FF2B5EF4-FFF2-40B4-BE49-F238E27FC236}">
-                <a16:creationId xmlns:a16="http://schemas.microsoft.com/office/drawing/2014/main" id="{867D4867-5BA7-4462-B2F6-A23F4A622AA7}"/>
-              </a:ext>
-              <a:ext uri="{C183D7F6-B498-43B3-948B-1728B52AA6E4}">
-                <adec:decorative xmlns:adec="http://schemas.microsoft.com/office/drawing/2017/decorative" val="1"/>
-              </a:ext>
-            </a:extLst>
-          </p:cNvPr>
-          <p:cNvSpPr>
-            <a:spLocks noGrp="1" noRot="1" noChangeAspect="1" noMove="1" noResize="1" noEditPoints="1" noAdjustHandles="1" noChangeArrowheads="1" noChangeShapeType="1" noTextEdit="1"/>
-          </p:cNvSpPr>
-          <p:nvPr>
-            <p:extLst>
-              <p:ext uri="{386F3935-93C4-4BCD-93E2-E3B085C9AB24}">
-                <p16:designElem xmlns:p16="http://schemas.microsoft.com/office/powerpoint/2015/main" val="1"/>
-              </p:ext>
-            </p:extLst>
-          </p:nvPr>
-        </p:nvSpPr>
-        <p:spPr>
-          <a:xfrm>
-            <a:off x="0" y="0"/>
-            <a:ext cx="3490722" cy="6858000"/>
-          </a:xfrm>
-          <a:prstGeom prst="rect">
-            <a:avLst/>
-          </a:prstGeom>
-          <a:solidFill>
-            <a:schemeClr val="tx1">
-              <a:lumMod val="75000"/>
-              <a:lumOff val="25000"/>
-            </a:schemeClr>
-          </a:solidFill>
-          <a:ln>
-            <a:noFill/>
-          </a:ln>
-        </p:spPr>
-        <p:style>
-          <a:lnRef idx="0">
-            <a:scrgbClr r="0" g="0" b="0"/>
-          </a:lnRef>
-          <a:fillRef idx="0">
-            <a:scrgbClr r="0" g="0" b="0"/>
-          </a:fillRef>
-          <a:effectRef idx="0">
-            <a:scrgbClr r="0" g="0" b="0"/>
-          </a:effectRef>
-          <a:fontRef idx="minor">
-            <a:schemeClr val="lt1"/>
-          </a:fontRef>
-        </p:style>
-        <p:txBody>
-          <a:bodyPr rtlCol="0" anchor="ctr"/>
-          <a:lstStyle/>
-          <a:p>
-            <a:pPr marL="0" marR="0" lvl="0" indent="0" algn="ctr" defTabSz="457200" rtl="0" eaLnBrk="1" fontAlgn="base" latinLnBrk="0" hangingPunct="1">
-              <a:lnSpc>
-                <a:spcPct val="100000"/>
-              </a:lnSpc>
-              <a:spcBef>
-                <a:spcPct val="0"/>
-              </a:spcBef>
-              <a:spcAft>
-                <a:spcPct val="0"/>
-              </a:spcAft>
-              <a:buClrTx/>
-              <a:buSzTx/>
-              <a:buFontTx/>
-              <a:buNone/>
-              <a:tabLst/>
-              <a:defRPr/>
-            </a:pPr>
-            <a:endParaRPr kumimoji="0" lang="en-US" sz="2400" b="0" i="0" u="none" strike="noStrike" kern="1200" cap="none" spc="0" normalizeH="0" baseline="0" noProof="0">
-              <a:ln>
-                <a:noFill/>
-              </a:ln>
-              <a:solidFill>
-                <a:prstClr val="white"/>
-              </a:solidFill>
-              <a:effectLst/>
-              <a:uLnTx/>
-              <a:uFillTx/>
-              <a:latin typeface="Calibri"/>
-              <a:ea typeface="+mn-ea"/>
-              <a:cs typeface="+mn-cs"/>
-            </a:endParaRPr>
-          </a:p>
-        </p:txBody>
-      </p:sp>
-      <p:sp>
-        <p:nvSpPr>
-          <p:cNvPr id="2" name="Title 1"/>
-          <p:cNvSpPr>
-            <a:spLocks noGrp="1"/>
-          </p:cNvSpPr>
-          <p:nvPr>
-            <p:ph type="title"/>
-          </p:nvPr>
-        </p:nvSpPr>
-        <p:spPr>
-          <a:xfrm>
-            <a:off x="482600" y="643467"/>
-            <a:ext cx="2522980" cy="1597315"/>
-          </a:xfrm>
-          <a:noFill/>
-          <a:ln w="19050">
-            <a:solidFill>
-              <a:schemeClr val="bg1"/>
-            </a:solidFill>
-          </a:ln>
-        </p:spPr>
-        <p:txBody>
-          <a:bodyPr vert="horz" wrap="square" lIns="91440" tIns="45720" rIns="91440" bIns="45720" rtlCol="0" anchor="ctr">
-            <a:normAutofit/>
-          </a:bodyPr>
-          <a:lstStyle/>
-          <a:p>
-            <a:pPr defTabSz="914400" eaLnBrk="1" hangingPunct="1">
-              <a:lnSpc>
-                <a:spcPct val="90000"/>
-              </a:lnSpc>
-            </a:pPr>
-            <a:r>
-              <a:rPr lang="en-US" sz="2400" dirty="0">
-                <a:solidFill>
-                  <a:schemeClr val="bg1"/>
-                </a:solidFill>
-              </a:rPr>
-              <a:t>Part 3: SRS</a:t>
-            </a:r>
-            <a:endParaRPr lang="en-US" sz="2400" kern="1200" dirty="0">
-              <a:solidFill>
-                <a:schemeClr val="bg1"/>
-              </a:solidFill>
-              <a:latin typeface="+mj-lt"/>
-              <a:ea typeface="+mj-ea"/>
-              <a:cs typeface="+mj-cs"/>
-            </a:endParaRPr>
-          </a:p>
-        </p:txBody>
-      </p:sp>
-      <p:pic>
-        <p:nvPicPr>
-          <p:cNvPr id="8" name="Picture 7">
-            <a:extLst>
-              <a:ext uri="{FF2B5EF4-FFF2-40B4-BE49-F238E27FC236}">
-                <a16:creationId xmlns:a16="http://schemas.microsoft.com/office/drawing/2014/main" id="{521D4292-9ECC-4DA5-8CC0-C561A0DA118E}"/>
-              </a:ext>
-            </a:extLst>
-          </p:cNvPr>
-          <p:cNvPicPr>
-            <a:picLocks noChangeAspect="1"/>
-          </p:cNvPicPr>
-          <p:nvPr/>
-        </p:nvPicPr>
-        <p:blipFill rotWithShape="1">
-          <a:blip r:embed="rId3"/>
-          <a:srcRect l="8000" r="9400"/>
-          <a:stretch/>
-        </p:blipFill>
-        <p:spPr>
-          <a:xfrm>
-            <a:off x="660103" y="3048000"/>
-            <a:ext cx="2167974" cy="2624666"/>
-          </a:xfrm>
-          <a:prstGeom prst="rect">
-            <a:avLst/>
-          </a:prstGeom>
-          <a:noFill/>
-        </p:spPr>
-      </p:pic>
-      <p:sp>
-        <p:nvSpPr>
-          <p:cNvPr id="6" name="TextBox 5">
-            <a:extLst>
-              <a:ext uri="{FF2B5EF4-FFF2-40B4-BE49-F238E27FC236}">
-                <a16:creationId xmlns:a16="http://schemas.microsoft.com/office/drawing/2014/main" id="{FC3DAEC3-3D5E-498E-BFE9-14205272B253}"/>
-              </a:ext>
-            </a:extLst>
-          </p:cNvPr>
-          <p:cNvSpPr txBox="1"/>
-          <p:nvPr/>
-        </p:nvSpPr>
-        <p:spPr>
-          <a:xfrm>
-            <a:off x="3781236" y="615207"/>
-            <a:ext cx="5286564" cy="3785652"/>
-          </a:xfrm>
-          <a:prstGeom prst="rect">
-            <a:avLst/>
-          </a:prstGeom>
-          <a:noFill/>
-        </p:spPr>
-        <p:txBody>
-          <a:bodyPr wrap="square" rtlCol="0">
-            <a:spAutoFit/>
-          </a:bodyPr>
-          <a:lstStyle/>
-          <a:p>
-            <a:pPr marL="342900" indent="-342900">
-              <a:buFont typeface="Arial" panose="020B0604020202020204" pitchFamily="34" charset="0"/>
-              <a:buChar char="•"/>
-              <a:defRPr/>
-            </a:pPr>
-            <a:r>
-              <a:rPr lang="en-US" dirty="0">
-                <a:solidFill>
-                  <a:srgbClr val="404040"/>
-                </a:solidFill>
-              </a:rPr>
-              <a:t>Sampling From Finite Set of Possible Outcomes</a:t>
-            </a:r>
-          </a:p>
-          <a:p>
-            <a:pPr marL="342900" indent="-342900">
-              <a:buFont typeface="Arial" panose="020B0604020202020204" pitchFamily="34" charset="0"/>
-              <a:buChar char="•"/>
-              <a:defRPr/>
-            </a:pPr>
-            <a:endParaRPr lang="en-US" dirty="0">
-              <a:solidFill>
-                <a:srgbClr val="404040"/>
-              </a:solidFill>
-            </a:endParaRPr>
-          </a:p>
-          <a:p>
-            <a:pPr marL="342900" indent="-342900">
-              <a:buFont typeface="Arial" panose="020B0604020202020204" pitchFamily="34" charset="0"/>
-              <a:buChar char="•"/>
-              <a:defRPr/>
-            </a:pPr>
-            <a:r>
-              <a:rPr lang="en-US" dirty="0">
-                <a:solidFill>
-                  <a:srgbClr val="404040"/>
-                </a:solidFill>
-              </a:rPr>
-              <a:t>Run Chunk 2</a:t>
-            </a:r>
-          </a:p>
-          <a:p>
-            <a:pPr marL="800100" lvl="1" indent="-342900">
-              <a:buFont typeface="Arial" panose="020B0604020202020204" pitchFamily="34" charset="0"/>
-              <a:buChar char="•"/>
-              <a:defRPr/>
-            </a:pPr>
-            <a:r>
-              <a:rPr lang="en-US" dirty="0">
-                <a:solidFill>
-                  <a:srgbClr val="404040"/>
-                </a:solidFill>
-              </a:rPr>
-              <a:t>Scenario: Flip k Coins</a:t>
-            </a:r>
-          </a:p>
-          <a:p>
-            <a:pPr marL="1257300" lvl="2" indent="-342900">
-              <a:buFont typeface="Arial" panose="020B0604020202020204" pitchFamily="34" charset="0"/>
-              <a:buChar char="•"/>
-              <a:defRPr/>
-            </a:pPr>
-            <a:r>
-              <a:rPr lang="en-US" dirty="0">
-                <a:solidFill>
-                  <a:srgbClr val="404040"/>
-                </a:solidFill>
-              </a:rPr>
-              <a:t>P(Heads) = BLANK </a:t>
-            </a:r>
-          </a:p>
-          <a:p>
-            <a:pPr marL="1257300" lvl="2" indent="-342900">
-              <a:buFont typeface="Arial" panose="020B0604020202020204" pitchFamily="34" charset="0"/>
-              <a:buChar char="•"/>
-              <a:defRPr/>
-            </a:pPr>
-            <a:r>
-              <a:rPr lang="en-US" dirty="0">
-                <a:solidFill>
-                  <a:srgbClr val="404040"/>
-                </a:solidFill>
-              </a:rPr>
-              <a:t>P(Tails) = 1-BLANK</a:t>
-            </a:r>
-          </a:p>
-          <a:p>
-            <a:pPr marL="800100" lvl="1" indent="-342900">
-              <a:buFont typeface="Arial" panose="020B0604020202020204" pitchFamily="34" charset="0"/>
-              <a:buChar char="•"/>
-              <a:defRPr/>
-            </a:pPr>
-            <a:r>
-              <a:rPr lang="en-US" dirty="0">
-                <a:solidFill>
-                  <a:srgbClr val="404040"/>
-                </a:solidFill>
-              </a:rPr>
-              <a:t>How would You Explain What the Figure is Showing to a Politician?</a:t>
-            </a:r>
-          </a:p>
-        </p:txBody>
-      </p:sp>
-    </p:spTree>
-    <p:custDataLst>
-      <p:tags r:id="rId1"/>
-    </p:custDataLst>
-    <p:extLst>
-      <p:ext uri="{BB962C8B-B14F-4D97-AF65-F5344CB8AC3E}">
-        <p14:creationId xmlns:p14="http://schemas.microsoft.com/office/powerpoint/2010/main" val="2729401136"/>
-      </p:ext>
-    </p:extLst>
-  </p:cSld>
-  <p:clrMapOvr>
-    <a:masterClrMapping/>
-  </p:clrMapOvr>
-</p:sld>
-</file>
-
-<file path=ppt/slides/slide17.xml><?xml version="1.0" encoding="utf-8"?>
-<p:sld xmlns:a="http://schemas.openxmlformats.org/drawingml/2006/main" xmlns:r="http://schemas.openxmlformats.org/officeDocument/2006/relationships" xmlns:p="http://schemas.openxmlformats.org/presentationml/2006/main">
-  <p:cSld>
-    <p:bg>
-      <p:bgPr>
-        <a:solidFill>
-          <a:schemeClr val="bg1">
-            <a:lumMod val="85000"/>
-          </a:schemeClr>
-        </a:solidFill>
-        <a:effectLst/>
-      </p:bgPr>
-    </p:bg>
-    <p:spTree>
-      <p:nvGrpSpPr>
-        <p:cNvPr id="1" name=""/>
-        <p:cNvGrpSpPr/>
-        <p:nvPr/>
-      </p:nvGrpSpPr>
-      <p:grpSpPr>
-        <a:xfrm>
-          <a:off x="0" y="0"/>
-          <a:ext cx="0" cy="0"/>
-          <a:chOff x="0" y="0"/>
-          <a:chExt cx="0" cy="0"/>
-        </a:xfrm>
-      </p:grpSpPr>
-      <p:sp>
-        <p:nvSpPr>
-          <p:cNvPr id="15" name="Rectangle 12">
-            <a:extLst>
-              <a:ext uri="{FF2B5EF4-FFF2-40B4-BE49-F238E27FC236}">
-                <a16:creationId xmlns:a16="http://schemas.microsoft.com/office/drawing/2014/main" id="{867D4867-5BA7-4462-B2F6-A23F4A622AA7}"/>
-              </a:ext>
-              <a:ext uri="{C183D7F6-B498-43B3-948B-1728B52AA6E4}">
-                <adec:decorative xmlns:adec="http://schemas.microsoft.com/office/drawing/2017/decorative" val="1"/>
-              </a:ext>
-            </a:extLst>
-          </p:cNvPr>
-          <p:cNvSpPr>
-            <a:spLocks noGrp="1" noRot="1" noChangeAspect="1" noMove="1" noResize="1" noEditPoints="1" noAdjustHandles="1" noChangeArrowheads="1" noChangeShapeType="1" noTextEdit="1"/>
-          </p:cNvSpPr>
-          <p:nvPr>
-            <p:extLst>
-              <p:ext uri="{386F3935-93C4-4BCD-93E2-E3B085C9AB24}">
-                <p16:designElem xmlns:p16="http://schemas.microsoft.com/office/powerpoint/2015/main" val="1"/>
-              </p:ext>
-            </p:extLst>
-          </p:nvPr>
-        </p:nvSpPr>
-        <p:spPr>
-          <a:xfrm>
-            <a:off x="0" y="0"/>
-            <a:ext cx="3490722" cy="6858000"/>
-          </a:xfrm>
-          <a:prstGeom prst="rect">
-            <a:avLst/>
-          </a:prstGeom>
-          <a:solidFill>
-            <a:schemeClr val="tx1">
-              <a:lumMod val="75000"/>
-              <a:lumOff val="25000"/>
-            </a:schemeClr>
-          </a:solidFill>
-          <a:ln>
-            <a:noFill/>
-          </a:ln>
-        </p:spPr>
-        <p:style>
-          <a:lnRef idx="0">
-            <a:scrgbClr r="0" g="0" b="0"/>
-          </a:lnRef>
-          <a:fillRef idx="0">
-            <a:scrgbClr r="0" g="0" b="0"/>
-          </a:fillRef>
-          <a:effectRef idx="0">
-            <a:scrgbClr r="0" g="0" b="0"/>
-          </a:effectRef>
-          <a:fontRef idx="minor">
-            <a:schemeClr val="lt1"/>
-          </a:fontRef>
-        </p:style>
-        <p:txBody>
-          <a:bodyPr rtlCol="0" anchor="ctr"/>
-          <a:lstStyle/>
-          <a:p>
             <a:pPr algn="ctr"/>
             <a:endParaRPr lang="en-US"/>
           </a:p>
@@ -16521,42 +14195,6 @@
 </file>
 
 <file path=ppt/tags/tag12.xml><?xml version="1.0" encoding="utf-8"?>
-<p:tagLst xmlns:a="http://schemas.openxmlformats.org/drawingml/2006/main" xmlns:r="http://schemas.openxmlformats.org/officeDocument/2006/relationships" xmlns:p="http://schemas.openxmlformats.org/presentationml/2006/main">
-  <p:tag name="DELIMITERS" val="3.1"/>
-</p:tagLst>
-</file>
-
-<file path=ppt/tags/tag13.xml><?xml version="1.0" encoding="utf-8"?>
-<p:tagLst xmlns:a="http://schemas.openxmlformats.org/drawingml/2006/main" xmlns:r="http://schemas.openxmlformats.org/officeDocument/2006/relationships" xmlns:p="http://schemas.openxmlformats.org/presentationml/2006/main">
-  <p:tag name="DELIMITERS" val="3.1"/>
-</p:tagLst>
-</file>
-
-<file path=ppt/tags/tag14.xml><?xml version="1.0" encoding="utf-8"?>
-<p:tagLst xmlns:a="http://schemas.openxmlformats.org/drawingml/2006/main" xmlns:r="http://schemas.openxmlformats.org/officeDocument/2006/relationships" xmlns:p="http://schemas.openxmlformats.org/presentationml/2006/main">
-  <p:tag name="DELIMITERS" val="3.1"/>
-</p:tagLst>
-</file>
-
-<file path=ppt/tags/tag15.xml><?xml version="1.0" encoding="utf-8"?>
-<p:tagLst xmlns:a="http://schemas.openxmlformats.org/drawingml/2006/main" xmlns:r="http://schemas.openxmlformats.org/officeDocument/2006/relationships" xmlns:p="http://schemas.openxmlformats.org/presentationml/2006/main">
-  <p:tag name="DELIMITERS" val="3.1"/>
-</p:tagLst>
-</file>
-
-<file path=ppt/tags/tag16.xml><?xml version="1.0" encoding="utf-8"?>
-<p:tagLst xmlns:a="http://schemas.openxmlformats.org/drawingml/2006/main" xmlns:r="http://schemas.openxmlformats.org/officeDocument/2006/relationships" xmlns:p="http://schemas.openxmlformats.org/presentationml/2006/main">
-  <p:tag name="DELIMITERS" val="3.1"/>
-</p:tagLst>
-</file>
-
-<file path=ppt/tags/tag17.xml><?xml version="1.0" encoding="utf-8"?>
-<p:tagLst xmlns:a="http://schemas.openxmlformats.org/drawingml/2006/main" xmlns:r="http://schemas.openxmlformats.org/officeDocument/2006/relationships" xmlns:p="http://schemas.openxmlformats.org/presentationml/2006/main">
-  <p:tag name="DELIMITERS" val="3.1"/>
-</p:tagLst>
-</file>
-
-<file path=ppt/tags/tag18.xml><?xml version="1.0" encoding="utf-8"?>
 <p:tagLst xmlns:a="http://schemas.openxmlformats.org/drawingml/2006/main" xmlns:r="http://schemas.openxmlformats.org/officeDocument/2006/relationships" xmlns:p="http://schemas.openxmlformats.org/presentationml/2006/main">
   <p:tag name="DELIMITERS" val="3.1"/>
 </p:tagLst>

</xml_diff>